<commit_message>
use vector instead of POINT
</commit_message>
<xml_diff>
--- a/Etc/두 점 사이 위치 계산.pptx
+++ b/Etc/두 점 사이 위치 계산.pptx
@@ -104,6 +104,11 @@
       </a:defRPr>
     </a:lvl9pPr>
   </p:defaultTextStyle>
+  <p:extLst>
+    <p:ext uri="{EFAFB233-063F-42B5-8137-9DF3F51BA10A}">
+      <p15:sldGuideLst xmlns:p15="http://schemas.microsoft.com/office/powerpoint/2012/main"/>
+    </p:ext>
+  </p:extLst>
 </p:presentation>
 </file>
 
@@ -3337,8 +3342,8 @@
             </p:nvSpPr>
             <p:spPr>
               <a:xfrm>
-                <a:off x="430504" y="3506789"/>
-                <a:ext cx="1854482" cy="1812740"/>
+                <a:off x="302965" y="3506789"/>
+                <a:ext cx="1796517" cy="1812740"/>
               </a:xfrm>
               <a:prstGeom prst="rect">
                 <a:avLst/>
@@ -3351,6 +3356,7 @@
               </a:bodyPr>
               <a:lstStyle/>
               <a:p>
+                <a:pPr/>
                 <a14:m>
                   <m:oMathPara xmlns:m="http://schemas.openxmlformats.org/officeDocument/2006/math">
                     <m:oMathParaPr>
@@ -3404,6 +3410,7 @@
                 </a:endParaRPr>
               </a:p>
               <a:p>
+                <a:pPr/>
                 <a14:m>
                   <m:oMathPara xmlns:m="http://schemas.openxmlformats.org/officeDocument/2006/math">
                     <m:oMathParaPr>
@@ -3432,6 +3439,12 @@
                         <m:t>atan</m:t>
                       </m:r>
                       <m:r>
+                        <a:rPr lang="en-US" altLang="ko-KR" b="0" i="0" smtClean="0">
+                          <a:latin typeface="Cambria Math" panose="02040503050406030204" pitchFamily="18" charset="0"/>
+                        </a:rPr>
+                        <m:t>2</m:t>
+                      </m:r>
+                      <m:r>
                         <a:rPr lang="en-US" altLang="ko-KR" b="0" i="1" smtClean="0">
                           <a:latin typeface="Cambria Math" panose="02040503050406030204" pitchFamily="18" charset="0"/>
                         </a:rPr>
@@ -3441,13 +3454,19 @@
                         <a:rPr lang="en-US" altLang="ko-KR" b="0" i="1" smtClean="0">
                           <a:latin typeface="Cambria Math" panose="02040503050406030204" pitchFamily="18" charset="0"/>
                         </a:rPr>
-                        <m:t>𝑡𝑎𝑛</m:t>
-                      </m:r>
-                      <m:r>
-                        <a:rPr lang="ko-KR" altLang="en-US" i="1" smtClean="0">
-                          <a:latin typeface="Cambria Math" panose="02040503050406030204" pitchFamily="18" charset="0"/>
-                        </a:rPr>
-                        <m:t>𝜃</m:t>
+                        <m:t>𝑦</m:t>
+                      </m:r>
+                      <m:r>
+                        <a:rPr lang="en-US" altLang="ko-KR" b="0" i="1" smtClean="0">
+                          <a:latin typeface="Cambria Math" panose="02040503050406030204" pitchFamily="18" charset="0"/>
+                        </a:rPr>
+                        <m:t>, </m:t>
+                      </m:r>
+                      <m:r>
+                        <a:rPr lang="en-US" altLang="ko-KR" b="0" i="1" smtClean="0">
+                          <a:latin typeface="Cambria Math" panose="02040503050406030204" pitchFamily="18" charset="0"/>
+                        </a:rPr>
+                        <m:t>𝑥</m:t>
                       </m:r>
                       <m:r>
                         <a:rPr lang="en-US" altLang="ko-KR" b="0" i="1" smtClean="0">
@@ -3463,6 +3482,7 @@
                 </a:endParaRPr>
               </a:p>
               <a:p>
+                <a:pPr/>
                 <a14:m>
                   <m:oMathPara xmlns:m="http://schemas.openxmlformats.org/officeDocument/2006/math">
                     <m:oMathParaPr>
@@ -3563,6 +3583,7 @@
                 </a:endParaRPr>
               </a:p>
               <a:p>
+                <a:pPr/>
                 <a14:m>
                   <m:oMathPara xmlns:m="http://schemas.openxmlformats.org/officeDocument/2006/math">
                     <m:oMathParaPr>
@@ -3620,6 +3641,7 @@
                 <a:endParaRPr lang="en-US" altLang="ko-KR" dirty="0"/>
               </a:p>
               <a:p>
+                <a:pPr/>
                 <a14:m>
                   <m:oMathPara xmlns:m="http://schemas.openxmlformats.org/officeDocument/2006/math">
                     <m:oMathParaPr>
@@ -3693,8 +3715,8 @@
             </p:nvSpPr>
             <p:spPr>
               <a:xfrm>
-                <a:off x="430504" y="3506789"/>
-                <a:ext cx="1854482" cy="1812740"/>
+                <a:off x="302965" y="3506789"/>
+                <a:ext cx="1796517" cy="1812740"/>
               </a:xfrm>
               <a:prstGeom prst="rect">
                 <a:avLst/>
@@ -3783,7 +3805,11 @@
             <a:lstStyle/>
             <a:p>
               <a:pPr algn="ctr"/>
-              <a:endParaRPr lang="ko-KR" altLang="en-US"/>
+              <a:r>
+                <a:rPr lang="en-US" altLang="ko-KR" dirty="0"/>
+                <a:t>E</a:t>
+              </a:r>
+              <a:endParaRPr lang="ko-KR" altLang="en-US" dirty="0"/>
             </a:p>
           </p:txBody>
         </p:sp>
@@ -3829,7 +3855,11 @@
             <a:lstStyle/>
             <a:p>
               <a:pPr algn="ctr"/>
-              <a:endParaRPr lang="ko-KR" altLang="en-US"/>
+              <a:r>
+                <a:rPr lang="en-US" altLang="ko-KR" dirty="0"/>
+                <a:t>P</a:t>
+              </a:r>
+              <a:endParaRPr lang="ko-KR" altLang="en-US" dirty="0"/>
             </a:p>
           </p:txBody>
         </p:sp>
@@ -4122,8 +4152,8 @@
             </a:p>
           </p:txBody>
         </p:sp>
-        <mc:AlternateContent xmlns:mc="http://schemas.openxmlformats.org/markup-compatibility/2006">
-          <mc:Choice xmlns:a14="http://schemas.microsoft.com/office/drawing/2010/main" Requires="a14">
+        <mc:AlternateContent xmlns:mc="http://schemas.openxmlformats.org/markup-compatibility/2006" xmlns:a14="http://schemas.microsoft.com/office/drawing/2010/main">
+          <mc:Choice Requires="a14">
             <p:sp>
               <p:nvSpPr>
                 <p:cNvPr id="23" name="TextBox 22">
@@ -4173,7 +4203,7 @@
               </p:txBody>
             </p:sp>
           </mc:Choice>
-          <mc:Fallback>
+          <mc:Fallback xmlns="">
             <p:sp>
               <p:nvSpPr>
                 <p:cNvPr id="23" name="TextBox 22">
@@ -4219,594 +4249,6 @@
           </mc:Fallback>
         </mc:AlternateContent>
       </p:grpSp>
-      <p:grpSp>
-        <p:nvGrpSpPr>
-          <p:cNvPr id="49" name="그룹 48">
-            <a:extLst>
-              <a:ext uri="{FF2B5EF4-FFF2-40B4-BE49-F238E27FC236}">
-                <a16:creationId xmlns:a16="http://schemas.microsoft.com/office/drawing/2014/main" id="{8765B548-7BAE-7084-07EB-13F298622574}"/>
-              </a:ext>
-            </a:extLst>
-          </p:cNvPr>
-          <p:cNvGrpSpPr/>
-          <p:nvPr/>
-        </p:nvGrpSpPr>
-        <p:grpSpPr>
-          <a:xfrm>
-            <a:off x="2640173" y="433450"/>
-            <a:ext cx="1462708" cy="2558741"/>
-            <a:chOff x="2389900" y="433450"/>
-            <a:chExt cx="1462708" cy="2558741"/>
-          </a:xfrm>
-        </p:grpSpPr>
-        <p:sp>
-          <p:nvSpPr>
-            <p:cNvPr id="37" name="직사각형 36">
-              <a:extLst>
-                <a:ext uri="{FF2B5EF4-FFF2-40B4-BE49-F238E27FC236}">
-                  <a16:creationId xmlns:a16="http://schemas.microsoft.com/office/drawing/2014/main" id="{A3BF6B1A-071B-C81B-5105-C2EFB5EF9B8E}"/>
-                </a:ext>
-              </a:extLst>
-            </p:cNvPr>
-            <p:cNvSpPr/>
-            <p:nvPr/>
-          </p:nvSpPr>
-          <p:spPr>
-            <a:xfrm>
-              <a:off x="3311226" y="924295"/>
-              <a:ext cx="380010" cy="380010"/>
-            </a:xfrm>
-            <a:prstGeom prst="rect">
-              <a:avLst/>
-            </a:prstGeom>
-          </p:spPr>
-          <p:style>
-            <a:lnRef idx="2">
-              <a:schemeClr val="accent2">
-                <a:shade val="50000"/>
-              </a:schemeClr>
-            </a:lnRef>
-            <a:fillRef idx="1">
-              <a:schemeClr val="accent2"/>
-            </a:fillRef>
-            <a:effectRef idx="0">
-              <a:schemeClr val="accent2"/>
-            </a:effectRef>
-            <a:fontRef idx="minor">
-              <a:schemeClr val="lt1"/>
-            </a:fontRef>
-          </p:style>
-          <p:txBody>
-            <a:bodyPr rtlCol="0" anchor="ctr"/>
-            <a:lstStyle/>
-            <a:p>
-              <a:pPr algn="ctr"/>
-              <a:endParaRPr lang="ko-KR" altLang="en-US"/>
-            </a:p>
-          </p:txBody>
-        </p:sp>
-        <p:sp>
-          <p:nvSpPr>
-            <p:cNvPr id="27" name="직사각형 26">
-              <a:extLst>
-                <a:ext uri="{FF2B5EF4-FFF2-40B4-BE49-F238E27FC236}">
-                  <a16:creationId xmlns:a16="http://schemas.microsoft.com/office/drawing/2014/main" id="{BA1EEEAD-D6A8-0934-C79D-82AD1CD1D94D}"/>
-                </a:ext>
-              </a:extLst>
-            </p:cNvPr>
-            <p:cNvSpPr/>
-            <p:nvPr/>
-          </p:nvSpPr>
-          <p:spPr>
-            <a:xfrm>
-              <a:off x="3311226" y="433450"/>
-              <a:ext cx="380010" cy="380010"/>
-            </a:xfrm>
-            <a:prstGeom prst="rect">
-              <a:avLst/>
-            </a:prstGeom>
-          </p:spPr>
-          <p:style>
-            <a:lnRef idx="2">
-              <a:schemeClr val="accent2">
-                <a:shade val="50000"/>
-              </a:schemeClr>
-            </a:lnRef>
-            <a:fillRef idx="1">
-              <a:schemeClr val="accent2"/>
-            </a:fillRef>
-            <a:effectRef idx="0">
-              <a:schemeClr val="accent2"/>
-            </a:effectRef>
-            <a:fontRef idx="minor">
-              <a:schemeClr val="lt1"/>
-            </a:fontRef>
-          </p:style>
-          <p:txBody>
-            <a:bodyPr rtlCol="0" anchor="ctr"/>
-            <a:lstStyle/>
-            <a:p>
-              <a:pPr algn="ctr"/>
-              <a:endParaRPr lang="ko-KR" altLang="en-US"/>
-            </a:p>
-          </p:txBody>
-        </p:sp>
-        <p:sp>
-          <p:nvSpPr>
-            <p:cNvPr id="28" name="직사각형 27">
-              <a:extLst>
-                <a:ext uri="{FF2B5EF4-FFF2-40B4-BE49-F238E27FC236}">
-                  <a16:creationId xmlns:a16="http://schemas.microsoft.com/office/drawing/2014/main" id="{1CD70848-8D58-CFD2-E098-52558DAF3DFA}"/>
-                </a:ext>
-              </a:extLst>
-            </p:cNvPr>
-            <p:cNvSpPr/>
-            <p:nvPr/>
-          </p:nvSpPr>
-          <p:spPr>
-            <a:xfrm>
-              <a:off x="2412660" y="2456213"/>
-              <a:ext cx="380010" cy="380010"/>
-            </a:xfrm>
-            <a:prstGeom prst="rect">
-              <a:avLst/>
-            </a:prstGeom>
-          </p:spPr>
-          <p:style>
-            <a:lnRef idx="2">
-              <a:schemeClr val="accent1">
-                <a:shade val="50000"/>
-              </a:schemeClr>
-            </a:lnRef>
-            <a:fillRef idx="1">
-              <a:schemeClr val="accent1"/>
-            </a:fillRef>
-            <a:effectRef idx="0">
-              <a:schemeClr val="accent1"/>
-            </a:effectRef>
-            <a:fontRef idx="minor">
-              <a:schemeClr val="lt1"/>
-            </a:fontRef>
-          </p:style>
-          <p:txBody>
-            <a:bodyPr rtlCol="0" anchor="ctr"/>
-            <a:lstStyle/>
-            <a:p>
-              <a:pPr algn="ctr"/>
-              <a:endParaRPr lang="ko-KR" altLang="en-US"/>
-            </a:p>
-          </p:txBody>
-        </p:sp>
-        <p:cxnSp>
-          <p:nvCxnSpPr>
-            <p:cNvPr id="30" name="직선 화살표 연결선 29">
-              <a:extLst>
-                <a:ext uri="{FF2B5EF4-FFF2-40B4-BE49-F238E27FC236}">
-                  <a16:creationId xmlns:a16="http://schemas.microsoft.com/office/drawing/2014/main" id="{2B67B1F6-F2E0-A194-A981-213DBE40DBA3}"/>
-                </a:ext>
-              </a:extLst>
-            </p:cNvPr>
-            <p:cNvCxnSpPr>
-              <a:cxnSpLocks/>
-            </p:cNvCxnSpPr>
-            <p:nvPr/>
-          </p:nvCxnSpPr>
-          <p:spPr>
-            <a:xfrm>
-              <a:off x="3501231" y="1114300"/>
-              <a:ext cx="0" cy="1531918"/>
-            </a:xfrm>
-            <a:prstGeom prst="straightConnector1">
-              <a:avLst/>
-            </a:prstGeom>
-            <a:ln>
-              <a:solidFill>
-                <a:srgbClr val="FF0000"/>
-              </a:solidFill>
-              <a:tailEnd type="triangle"/>
-            </a:ln>
-          </p:spPr>
-          <p:style>
-            <a:lnRef idx="1">
-              <a:schemeClr val="accent1"/>
-            </a:lnRef>
-            <a:fillRef idx="0">
-              <a:schemeClr val="accent1"/>
-            </a:fillRef>
-            <a:effectRef idx="0">
-              <a:schemeClr val="accent1"/>
-            </a:effectRef>
-            <a:fontRef idx="minor">
-              <a:schemeClr val="tx1"/>
-            </a:fontRef>
-          </p:style>
-        </p:cxnSp>
-        <p:cxnSp>
-          <p:nvCxnSpPr>
-            <p:cNvPr id="31" name="직선 화살표 연결선 30">
-              <a:extLst>
-                <a:ext uri="{FF2B5EF4-FFF2-40B4-BE49-F238E27FC236}">
-                  <a16:creationId xmlns:a16="http://schemas.microsoft.com/office/drawing/2014/main" id="{31F077BF-CC22-8FDE-AE3A-B39F6DD5674C}"/>
-                </a:ext>
-              </a:extLst>
-            </p:cNvPr>
-            <p:cNvCxnSpPr>
-              <a:cxnSpLocks/>
-            </p:cNvCxnSpPr>
-            <p:nvPr/>
-          </p:nvCxnSpPr>
-          <p:spPr>
-            <a:xfrm flipH="1">
-              <a:off x="2602664" y="2646218"/>
-              <a:ext cx="898567" cy="0"/>
-            </a:xfrm>
-            <a:prstGeom prst="straightConnector1">
-              <a:avLst/>
-            </a:prstGeom>
-            <a:ln>
-              <a:solidFill>
-                <a:srgbClr val="FF0000"/>
-              </a:solidFill>
-              <a:tailEnd type="triangle"/>
-            </a:ln>
-          </p:spPr>
-          <p:style>
-            <a:lnRef idx="1">
-              <a:schemeClr val="accent1"/>
-            </a:lnRef>
-            <a:fillRef idx="0">
-              <a:schemeClr val="accent1"/>
-            </a:fillRef>
-            <a:effectRef idx="0">
-              <a:schemeClr val="accent1"/>
-            </a:effectRef>
-            <a:fontRef idx="minor">
-              <a:schemeClr val="tx1"/>
-            </a:fontRef>
-          </p:style>
-        </p:cxnSp>
-        <p:sp>
-          <p:nvSpPr>
-            <p:cNvPr id="32" name="원호 31">
-              <a:extLst>
-                <a:ext uri="{FF2B5EF4-FFF2-40B4-BE49-F238E27FC236}">
-                  <a16:creationId xmlns:a16="http://schemas.microsoft.com/office/drawing/2014/main" id="{A57F66AA-CED6-09E5-C03D-A5DBD80C1FD1}"/>
-                </a:ext>
-              </a:extLst>
-            </p:cNvPr>
-            <p:cNvSpPr/>
-            <p:nvPr/>
-          </p:nvSpPr>
-          <p:spPr>
-            <a:xfrm>
-              <a:off x="2389900" y="2345378"/>
-              <a:ext cx="657100" cy="623454"/>
-            </a:xfrm>
-            <a:prstGeom prst="arc">
-              <a:avLst/>
-            </a:prstGeom>
-            <a:ln>
-              <a:solidFill>
-                <a:srgbClr val="FF0000"/>
-              </a:solidFill>
-            </a:ln>
-          </p:spPr>
-          <p:style>
-            <a:lnRef idx="1">
-              <a:schemeClr val="accent1"/>
-            </a:lnRef>
-            <a:fillRef idx="0">
-              <a:schemeClr val="accent1"/>
-            </a:fillRef>
-            <a:effectRef idx="0">
-              <a:schemeClr val="accent1"/>
-            </a:effectRef>
-            <a:fontRef idx="minor">
-              <a:schemeClr val="tx1"/>
-            </a:fontRef>
-          </p:style>
-          <p:txBody>
-            <a:bodyPr rtlCol="0" anchor="ctr"/>
-            <a:lstStyle/>
-            <a:p>
-              <a:pPr algn="ctr"/>
-              <a:endParaRPr lang="ko-KR" altLang="en-US"/>
-            </a:p>
-          </p:txBody>
-        </p:sp>
-        <p:sp>
-          <p:nvSpPr>
-            <p:cNvPr id="33" name="TextBox 32">
-              <a:extLst>
-                <a:ext uri="{FF2B5EF4-FFF2-40B4-BE49-F238E27FC236}">
-                  <a16:creationId xmlns:a16="http://schemas.microsoft.com/office/drawing/2014/main" id="{94785688-411B-7C57-2C66-9553602EAD9D}"/>
-                </a:ext>
-              </a:extLst>
-            </p:cNvPr>
-            <p:cNvSpPr txBox="1"/>
-            <p:nvPr/>
-          </p:nvSpPr>
-          <p:spPr>
-            <a:xfrm>
-              <a:off x="3059357" y="1613829"/>
-              <a:ext cx="334066" cy="369332"/>
-            </a:xfrm>
-            <a:prstGeom prst="rect">
-              <a:avLst/>
-            </a:prstGeom>
-            <a:noFill/>
-          </p:spPr>
-          <p:txBody>
-            <a:bodyPr wrap="none" rtlCol="0">
-              <a:spAutoFit/>
-            </a:bodyPr>
-            <a:lstStyle/>
-            <a:p>
-              <a:r>
-                <a:rPr lang="en-US" altLang="ko-KR" dirty="0"/>
-                <a:t>r’</a:t>
-              </a:r>
-              <a:endParaRPr lang="ko-KR" altLang="en-US" dirty="0"/>
-            </a:p>
-          </p:txBody>
-        </p:sp>
-        <p:sp>
-          <p:nvSpPr>
-            <p:cNvPr id="34" name="TextBox 33">
-              <a:extLst>
-                <a:ext uri="{FF2B5EF4-FFF2-40B4-BE49-F238E27FC236}">
-                  <a16:creationId xmlns:a16="http://schemas.microsoft.com/office/drawing/2014/main" id="{19F4B06D-1CB5-E33A-4E21-069934F2FCDF}"/>
-                </a:ext>
-              </a:extLst>
-            </p:cNvPr>
-            <p:cNvSpPr txBox="1"/>
-            <p:nvPr/>
-          </p:nvSpPr>
-          <p:spPr>
-            <a:xfrm>
-              <a:off x="3501230" y="1697778"/>
-              <a:ext cx="351378" cy="369332"/>
-            </a:xfrm>
-            <a:prstGeom prst="rect">
-              <a:avLst/>
-            </a:prstGeom>
-            <a:noFill/>
-          </p:spPr>
-          <p:txBody>
-            <a:bodyPr wrap="none" rtlCol="0">
-              <a:spAutoFit/>
-            </a:bodyPr>
-            <a:lstStyle/>
-            <a:p>
-              <a:r>
-                <a:rPr lang="en-US" altLang="ko-KR" dirty="0"/>
-                <a:t>y’</a:t>
-              </a:r>
-              <a:endParaRPr lang="ko-KR" altLang="en-US" dirty="0"/>
-            </a:p>
-          </p:txBody>
-        </p:sp>
-        <p:sp>
-          <p:nvSpPr>
-            <p:cNvPr id="35" name="TextBox 34">
-              <a:extLst>
-                <a:ext uri="{FF2B5EF4-FFF2-40B4-BE49-F238E27FC236}">
-                  <a16:creationId xmlns:a16="http://schemas.microsoft.com/office/drawing/2014/main" id="{FA6F65B7-B540-948D-AD14-ED4F9B5F4C36}"/>
-                </a:ext>
-              </a:extLst>
-            </p:cNvPr>
-            <p:cNvSpPr txBox="1"/>
-            <p:nvPr/>
-          </p:nvSpPr>
-          <p:spPr>
-            <a:xfrm>
-              <a:off x="2982047" y="2622859"/>
-              <a:ext cx="344966" cy="369332"/>
-            </a:xfrm>
-            <a:prstGeom prst="rect">
-              <a:avLst/>
-            </a:prstGeom>
-            <a:noFill/>
-          </p:spPr>
-          <p:txBody>
-            <a:bodyPr wrap="none" rtlCol="0">
-              <a:spAutoFit/>
-            </a:bodyPr>
-            <a:lstStyle/>
-            <a:p>
-              <a:r>
-                <a:rPr lang="en-US" altLang="ko-KR" dirty="0"/>
-                <a:t>x’</a:t>
-              </a:r>
-              <a:endParaRPr lang="ko-KR" altLang="en-US" dirty="0"/>
-            </a:p>
-          </p:txBody>
-        </p:sp>
-        <mc:AlternateContent xmlns:mc="http://schemas.openxmlformats.org/markup-compatibility/2006">
-          <mc:Choice xmlns:a14="http://schemas.microsoft.com/office/drawing/2010/main" Requires="a14">
-            <p:sp>
-              <p:nvSpPr>
-                <p:cNvPr id="36" name="TextBox 35">
-                  <a:extLst>
-                    <a:ext uri="{FF2B5EF4-FFF2-40B4-BE49-F238E27FC236}">
-                      <a16:creationId xmlns:a16="http://schemas.microsoft.com/office/drawing/2014/main" id="{CEFD4EF2-5D60-2912-FDE9-48C1E5DF3C51}"/>
-                    </a:ext>
-                  </a:extLst>
-                </p:cNvPr>
-                <p:cNvSpPr txBox="1"/>
-                <p:nvPr/>
-              </p:nvSpPr>
-              <p:spPr>
-                <a:xfrm>
-                  <a:off x="2871599" y="2103900"/>
-                  <a:ext cx="278723" cy="369332"/>
-                </a:xfrm>
-                <a:prstGeom prst="rect">
-                  <a:avLst/>
-                </a:prstGeom>
-                <a:noFill/>
-              </p:spPr>
-              <p:txBody>
-                <a:bodyPr wrap="square">
-                  <a:spAutoFit/>
-                </a:bodyPr>
-                <a:lstStyle/>
-                <a:p>
-                  <a:pPr/>
-                  <a14:m>
-                    <m:oMathPara xmlns:m="http://schemas.openxmlformats.org/officeDocument/2006/math">
-                      <m:oMathParaPr>
-                        <m:jc m:val="centerGroup"/>
-                      </m:oMathParaPr>
-                      <m:oMath xmlns:m="http://schemas.openxmlformats.org/officeDocument/2006/math">
-                        <m:r>
-                          <a:rPr lang="ko-KR" altLang="en-US" i="1" smtClean="0">
-                            <a:latin typeface="Cambria Math" panose="02040503050406030204" pitchFamily="18" charset="0"/>
-                          </a:rPr>
-                          <m:t>𝜃</m:t>
-                        </m:r>
-                      </m:oMath>
-                    </m:oMathPara>
-                  </a14:m>
-                  <a:endParaRPr lang="ko-KR" altLang="en-US" dirty="0"/>
-                </a:p>
-              </p:txBody>
-            </p:sp>
-          </mc:Choice>
-          <mc:Fallback>
-            <p:sp>
-              <p:nvSpPr>
-                <p:cNvPr id="36" name="TextBox 35">
-                  <a:extLst>
-                    <a:ext uri="{FF2B5EF4-FFF2-40B4-BE49-F238E27FC236}">
-                      <a16:creationId xmlns:a16="http://schemas.microsoft.com/office/drawing/2014/main" id="{CEFD4EF2-5D60-2912-FDE9-48C1E5DF3C51}"/>
-                    </a:ext>
-                  </a:extLst>
-                </p:cNvPr>
-                <p:cNvSpPr txBox="1">
-                  <a:spLocks noRot="1" noChangeAspect="1" noMove="1" noResize="1" noEditPoints="1" noAdjustHandles="1" noChangeArrowheads="1" noChangeShapeType="1" noTextEdit="1"/>
-                </p:cNvSpPr>
-                <p:nvPr/>
-              </p:nvSpPr>
-              <p:spPr>
-                <a:xfrm>
-                  <a:off x="2871599" y="2103900"/>
-                  <a:ext cx="278723" cy="369332"/>
-                </a:xfrm>
-                <a:prstGeom prst="rect">
-                  <a:avLst/>
-                </a:prstGeom>
-                <a:blipFill>
-                  <a:blip r:embed="rId4"/>
-                  <a:stretch>
-                    <a:fillRect r="-8696"/>
-                  </a:stretch>
-                </a:blipFill>
-              </p:spPr>
-              <p:txBody>
-                <a:bodyPr/>
-                <a:lstStyle/>
-                <a:p>
-                  <a:r>
-                    <a:rPr lang="ko-KR" altLang="en-US">
-                      <a:noFill/>
-                    </a:rPr>
-                    <a:t> </a:t>
-                  </a:r>
-                </a:p>
-              </p:txBody>
-            </p:sp>
-          </mc:Fallback>
-        </mc:AlternateContent>
-        <p:cxnSp>
-          <p:nvCxnSpPr>
-            <p:cNvPr id="43" name="직선 화살표 연결선 42">
-              <a:extLst>
-                <a:ext uri="{FF2B5EF4-FFF2-40B4-BE49-F238E27FC236}">
-                  <a16:creationId xmlns:a16="http://schemas.microsoft.com/office/drawing/2014/main" id="{6EC5EE88-32AF-9ED0-118A-0554C1BDCE03}"/>
-                </a:ext>
-              </a:extLst>
-            </p:cNvPr>
-            <p:cNvCxnSpPr>
-              <a:cxnSpLocks/>
-            </p:cNvCxnSpPr>
-            <p:nvPr/>
-          </p:nvCxnSpPr>
-          <p:spPr>
-            <a:xfrm flipH="1">
-              <a:off x="2591598" y="1114300"/>
-              <a:ext cx="909633" cy="1531918"/>
-            </a:xfrm>
-            <a:prstGeom prst="straightConnector1">
-              <a:avLst/>
-            </a:prstGeom>
-            <a:ln>
-              <a:solidFill>
-                <a:srgbClr val="FF0000"/>
-              </a:solidFill>
-              <a:tailEnd type="triangle"/>
-            </a:ln>
-          </p:spPr>
-          <p:style>
-            <a:lnRef idx="1">
-              <a:schemeClr val="accent1"/>
-            </a:lnRef>
-            <a:fillRef idx="0">
-              <a:schemeClr val="accent1"/>
-            </a:fillRef>
-            <a:effectRef idx="0">
-              <a:schemeClr val="accent1"/>
-            </a:effectRef>
-            <a:fontRef idx="minor">
-              <a:schemeClr val="tx1"/>
-            </a:fontRef>
-          </p:style>
-        </p:cxnSp>
-        <p:cxnSp>
-          <p:nvCxnSpPr>
-            <p:cNvPr id="29" name="직선 화살표 연결선 28">
-              <a:extLst>
-                <a:ext uri="{FF2B5EF4-FFF2-40B4-BE49-F238E27FC236}">
-                  <a16:creationId xmlns:a16="http://schemas.microsoft.com/office/drawing/2014/main" id="{80966536-1783-B396-95A3-F438E2629217}"/>
-                </a:ext>
-              </a:extLst>
-            </p:cNvPr>
-            <p:cNvCxnSpPr>
-              <a:cxnSpLocks/>
-            </p:cNvCxnSpPr>
-            <p:nvPr/>
-          </p:nvCxnSpPr>
-          <p:spPr>
-            <a:xfrm flipH="1">
-              <a:off x="2602665" y="623455"/>
-              <a:ext cx="898566" cy="2022763"/>
-            </a:xfrm>
-            <a:prstGeom prst="straightConnector1">
-              <a:avLst/>
-            </a:prstGeom>
-            <a:ln>
-              <a:solidFill>
-                <a:schemeClr val="tx1"/>
-              </a:solidFill>
-              <a:tailEnd type="triangle"/>
-            </a:ln>
-          </p:spPr>
-          <p:style>
-            <a:lnRef idx="1">
-              <a:schemeClr val="accent1"/>
-            </a:lnRef>
-            <a:fillRef idx="0">
-              <a:schemeClr val="accent1"/>
-            </a:fillRef>
-            <a:effectRef idx="0">
-              <a:schemeClr val="accent1"/>
-            </a:effectRef>
-            <a:fontRef idx="minor">
-              <a:schemeClr val="tx1"/>
-            </a:fontRef>
-          </p:style>
-        </p:cxnSp>
-      </p:grpSp>
       <mc:AlternateContent xmlns:mc="http://schemas.openxmlformats.org/markup-compatibility/2006">
         <mc:Choice xmlns:a14="http://schemas.microsoft.com/office/drawing/2010/main" Requires="a14">
           <p:sp>
@@ -4823,8 +4265,8 @@
             </p:nvSpPr>
             <p:spPr>
               <a:xfrm>
-                <a:off x="4437931" y="444128"/>
-                <a:ext cx="2397131" cy="1258743"/>
+                <a:off x="3061070" y="187801"/>
+                <a:ext cx="3974165" cy="4870116"/>
               </a:xfrm>
               <a:prstGeom prst="rect">
                 <a:avLst/>
@@ -4837,161 +4279,117 @@
               </a:bodyPr>
               <a:lstStyle/>
               <a:p>
+                <a:pPr/>
+                <a14:m>
+                  <m:oMathPara xmlns:m="http://schemas.openxmlformats.org/officeDocument/2006/math">
+                    <m:oMathParaPr>
+                      <m:jc m:val="left"/>
+                    </m:oMathParaPr>
+                    <m:oMath xmlns:m="http://schemas.openxmlformats.org/officeDocument/2006/math">
+                      <m:r>
+                        <a:rPr lang="en-US" altLang="ko-KR" b="0" i="1" smtClean="0">
+                          <a:latin typeface="Cambria Math" panose="02040503050406030204" pitchFamily="18" charset="0"/>
+                        </a:rPr>
+                        <m:t>𝐸</m:t>
+                      </m:r>
+                      <m:r>
+                        <a:rPr lang="en-US" altLang="ko-KR" b="0" i="1" smtClean="0">
+                          <a:latin typeface="Cambria Math" panose="02040503050406030204" pitchFamily="18" charset="0"/>
+                        </a:rPr>
+                        <m:t>→</m:t>
+                      </m:r>
+                      <m:r>
+                        <a:rPr lang="en-US" altLang="ko-KR" b="0" i="1" smtClean="0">
+                          <a:latin typeface="Cambria Math" panose="02040503050406030204" pitchFamily="18" charset="0"/>
+                        </a:rPr>
+                        <m:t>𝑃</m:t>
+                      </m:r>
+                      <m:r>
+                        <a:rPr lang="en-US" altLang="ko-KR" b="0" i="1" smtClean="0">
+                          <a:latin typeface="Cambria Math" panose="02040503050406030204" pitchFamily="18" charset="0"/>
+                        </a:rPr>
+                        <m:t> </m:t>
+                      </m:r>
+                      <m:r>
+                        <a:rPr lang="ko-KR" altLang="en-US" i="1" smtClean="0">
+                          <a:latin typeface="Cambria Math" panose="02040503050406030204" pitchFamily="18" charset="0"/>
+                        </a:rPr>
+                        <m:t>벡터</m:t>
+                      </m:r>
+                      <m:r>
+                        <a:rPr lang="en-US" altLang="ko-KR" b="0" i="1" smtClean="0">
+                          <a:latin typeface="Cambria Math" panose="02040503050406030204" pitchFamily="18" charset="0"/>
+                        </a:rPr>
+                        <m:t> </m:t>
+                      </m:r>
+                      <m:r>
+                        <a:rPr lang="ko-KR" altLang="en-US" i="1">
+                          <a:latin typeface="Cambria Math" panose="02040503050406030204" pitchFamily="18" charset="0"/>
+                        </a:rPr>
+                        <m:t>구</m:t>
+                      </m:r>
+                      <m:r>
+                        <a:rPr lang="ko-KR" altLang="en-US" i="1" smtClean="0">
+                          <a:latin typeface="Cambria Math" panose="02040503050406030204" pitchFamily="18" charset="0"/>
+                        </a:rPr>
+                        <m:t>하</m:t>
+                      </m:r>
+                      <m:r>
+                        <a:rPr lang="ko-KR" altLang="en-US" i="1">
+                          <a:latin typeface="Cambria Math" panose="02040503050406030204" pitchFamily="18" charset="0"/>
+                        </a:rPr>
+                        <m:t>기</m:t>
+                      </m:r>
+                    </m:oMath>
+                  </m:oMathPara>
+                </a14:m>
+                <a:endParaRPr lang="en-US" altLang="ko-KR" i="1" dirty="0">
+                  <a:latin typeface="Cambria Math" panose="02040503050406030204" pitchFamily="18" charset="0"/>
+                </a:endParaRPr>
+              </a:p>
+              <a:p>
+                <a:pPr/>
                 <a:r>
                   <a:rPr lang="en-US" altLang="ko-KR" dirty="0"/>
-                  <a:t>y</a:t>
-                </a:r>
-                <a:r>
-                  <a:rPr lang="ko-KR" altLang="en-US" dirty="0"/>
-                  <a:t>축으로 </a:t>
-                </a:r>
-                <a:r>
-                  <a:rPr lang="en-US" altLang="ko-KR" dirty="0"/>
-                  <a:t>‘-’ </a:t>
-                </a:r>
-                <a:r>
-                  <a:rPr lang="ko-KR" altLang="en-US" dirty="0"/>
-                  <a:t>이동</a:t>
-                </a:r>
-                <a:r>
-                  <a:rPr lang="en-US" altLang="ko-KR" dirty="0"/>
-                  <a:t>(y’)</a:t>
-                </a:r>
-              </a:p>
-              <a:p>
-                <a:r>
-                  <a:rPr lang="en-US" altLang="ko-KR" dirty="0"/>
-                  <a:t>-&gt; </a:t>
+                  <a:t>Vector = </a:t>
                 </a:r>
                 <a14:m>
                   <m:oMath xmlns:m="http://schemas.openxmlformats.org/officeDocument/2006/math">
                     <m:r>
-                      <a:rPr lang="ko-KR" altLang="en-US" i="1" smtClean="0">
+                      <m:rPr>
+                        <m:sty m:val="p"/>
+                      </m:rPr>
+                      <a:rPr lang="en-US" altLang="ko-KR">
                         <a:latin typeface="Cambria Math" panose="02040503050406030204" pitchFamily="18" charset="0"/>
                       </a:rPr>
-                      <m:t>𝜃</m:t>
+                      <m:t>E</m:t>
+                    </m:r>
+                    <m:r>
+                      <a:rPr lang="en-US" altLang="ko-KR" b="0" i="0" smtClean="0">
+                        <a:latin typeface="Cambria Math" panose="02040503050406030204" pitchFamily="18" charset="0"/>
+                      </a:rPr>
+                      <m:t> −</m:t>
+                    </m:r>
+                    <m:r>
+                      <m:rPr>
+                        <m:sty m:val="p"/>
+                      </m:rPr>
+                      <a:rPr lang="en-US" altLang="ko-KR" b="0" i="0" smtClean="0">
+                        <a:latin typeface="Cambria Math" panose="02040503050406030204" pitchFamily="18" charset="0"/>
+                      </a:rPr>
+                      <m:t>P</m:t>
                     </m:r>
                   </m:oMath>
                 </a14:m>
-                <a:r>
-                  <a:rPr lang="ko-KR" altLang="en-US" dirty="0"/>
-                  <a:t>에 따른 </a:t>
-                </a:r>
-                <a:r>
-                  <a:rPr lang="en-US" altLang="ko-KR" dirty="0"/>
-                  <a:t>x</a:t>
-                </a:r>
-                <a:r>
-                  <a:rPr lang="ko-KR" altLang="en-US" dirty="0"/>
-                  <a:t>값 계산</a:t>
-                </a:r>
-                <a:endParaRPr lang="en-US" altLang="ko-KR" dirty="0"/>
+                <a:endParaRPr lang="en-US" altLang="ko-KR" i="1" dirty="0">
+                  <a:latin typeface="Cambria Math" panose="02040503050406030204" pitchFamily="18" charset="0"/>
+                </a:endParaRPr>
               </a:p>
               <a:p>
                 <a:pPr/>
-                <a14:m>
-                  <m:oMath xmlns:m="http://schemas.openxmlformats.org/officeDocument/2006/math">
-                    <m:r>
-                      <a:rPr lang="en-US" altLang="ko-KR" b="0" i="1" smtClean="0">
-                        <a:latin typeface="Cambria Math" panose="02040503050406030204" pitchFamily="18" charset="0"/>
-                      </a:rPr>
-                      <m:t>𝑟</m:t>
-                    </m:r>
-                    <m:r>
-                      <a:rPr lang="en-US" altLang="ko-KR" b="0" i="1" smtClean="0">
-                        <a:latin typeface="Cambria Math" panose="02040503050406030204" pitchFamily="18" charset="0"/>
-                      </a:rPr>
-                      <m:t>′=</m:t>
-                    </m:r>
-                    <m:rad>
-                      <m:radPr>
-                        <m:degHide m:val="on"/>
-                        <m:ctrlPr>
-                          <a:rPr lang="en-US" altLang="ko-KR" b="0" i="1" smtClean="0">
-                            <a:latin typeface="Cambria Math" panose="02040503050406030204" pitchFamily="18" charset="0"/>
-                          </a:rPr>
-                        </m:ctrlPr>
-                      </m:radPr>
-                      <m:deg/>
-                      <m:e>
-                        <m:sSup>
-                          <m:sSupPr>
-                            <m:ctrlPr>
-                              <a:rPr lang="en-US" altLang="ko-KR" b="0" i="1" smtClean="0">
-                                <a:latin typeface="Cambria Math" panose="02040503050406030204" pitchFamily="18" charset="0"/>
-                              </a:rPr>
-                            </m:ctrlPr>
-                          </m:sSupPr>
-                          <m:e>
-                            <m:r>
-                              <a:rPr lang="en-US" altLang="ko-KR" b="0" i="1" smtClean="0">
-                                <a:latin typeface="Cambria Math" panose="02040503050406030204" pitchFamily="18" charset="0"/>
-                              </a:rPr>
-                              <m:t>𝑥</m:t>
-                            </m:r>
-                            <m:r>
-                              <a:rPr lang="en-US" altLang="ko-KR" b="0" i="1" smtClean="0">
-                                <a:latin typeface="Cambria Math" panose="02040503050406030204" pitchFamily="18" charset="0"/>
-                              </a:rPr>
-                              <m:t>′</m:t>
-                            </m:r>
-                          </m:e>
-                          <m:sup>
-                            <m:r>
-                              <a:rPr lang="en-US" altLang="ko-KR" b="0" i="1" smtClean="0">
-                                <a:latin typeface="Cambria Math" panose="02040503050406030204" pitchFamily="18" charset="0"/>
-                              </a:rPr>
-                              <m:t>2</m:t>
-                            </m:r>
-                          </m:sup>
-                        </m:sSup>
-                        <m:r>
-                          <a:rPr lang="en-US" altLang="ko-KR" b="0" i="1" smtClean="0">
-                            <a:latin typeface="Cambria Math" panose="02040503050406030204" pitchFamily="18" charset="0"/>
-                          </a:rPr>
-                          <m:t>+</m:t>
-                        </m:r>
-                        <m:sSup>
-                          <m:sSupPr>
-                            <m:ctrlPr>
-                              <a:rPr lang="en-US" altLang="ko-KR" b="0" i="1" smtClean="0">
-                                <a:latin typeface="Cambria Math" panose="02040503050406030204" pitchFamily="18" charset="0"/>
-                              </a:rPr>
-                            </m:ctrlPr>
-                          </m:sSupPr>
-                          <m:e>
-                            <m:r>
-                              <a:rPr lang="en-US" altLang="ko-KR" b="0" i="1" smtClean="0">
-                                <a:latin typeface="Cambria Math" panose="02040503050406030204" pitchFamily="18" charset="0"/>
-                              </a:rPr>
-                              <m:t>𝑦</m:t>
-                            </m:r>
-                            <m:r>
-                              <a:rPr lang="en-US" altLang="ko-KR" b="0" i="1" smtClean="0">
-                                <a:latin typeface="Cambria Math" panose="02040503050406030204" pitchFamily="18" charset="0"/>
-                              </a:rPr>
-                              <m:t>′</m:t>
-                            </m:r>
-                          </m:e>
-                          <m:sup>
-                            <m:r>
-                              <a:rPr lang="en-US" altLang="ko-KR" b="0" i="1" smtClean="0">
-                                <a:latin typeface="Cambria Math" panose="02040503050406030204" pitchFamily="18" charset="0"/>
-                              </a:rPr>
-                              <m:t>2</m:t>
-                            </m:r>
-                          </m:sup>
-                        </m:sSup>
-                      </m:e>
-                    </m:rad>
-                  </m:oMath>
-                </a14:m>
-                <a:r>
-                  <a:rPr lang="en-US" altLang="ko-KR" dirty="0">
-                    <a:latin typeface="Cambria Math" panose="02040503050406030204" pitchFamily="18" charset="0"/>
-                  </a:rPr>
-                  <a:t> </a:t>
-                </a:r>
+                <a:endParaRPr lang="en-US" altLang="ko-KR" i="1" dirty="0">
+                  <a:latin typeface="Cambria Math" panose="02040503050406030204" pitchFamily="18" charset="0"/>
+                </a:endParaRPr>
               </a:p>
               <a:p>
                 <a:pPr/>
@@ -5002,54 +4400,331 @@
                     </m:oMathParaPr>
                     <m:oMath xmlns:m="http://schemas.openxmlformats.org/officeDocument/2006/math">
                       <m:r>
+                        <a:rPr lang="ko-KR" altLang="en-US" i="1" smtClean="0">
+                          <a:latin typeface="Cambria Math" panose="02040503050406030204" pitchFamily="18" charset="0"/>
+                        </a:rPr>
+                        <m:t>𝜃</m:t>
+                      </m:r>
+                      <m:r>
+                        <a:rPr lang="en-US" altLang="ko-KR" b="0" i="0" smtClean="0">
+                          <a:latin typeface="Cambria Math" panose="02040503050406030204" pitchFamily="18" charset="0"/>
+                        </a:rPr>
+                        <m:t> </m:t>
+                      </m:r>
+                      <m:r>
+                        <a:rPr lang="ko-KR" altLang="en-US" i="1">
+                          <a:latin typeface="Cambria Math" panose="02040503050406030204" pitchFamily="18" charset="0"/>
+                        </a:rPr>
+                        <m:t>구</m:t>
+                      </m:r>
+                      <m:r>
+                        <a:rPr lang="ko-KR" altLang="en-US" i="1" smtClean="0">
+                          <a:latin typeface="Cambria Math" panose="02040503050406030204" pitchFamily="18" charset="0"/>
+                        </a:rPr>
+                        <m:t>하</m:t>
+                      </m:r>
+                      <m:r>
+                        <a:rPr lang="ko-KR" altLang="en-US" i="1">
+                          <a:latin typeface="Cambria Math" panose="02040503050406030204" pitchFamily="18" charset="0"/>
+                        </a:rPr>
+                        <m:t>기</m:t>
+                      </m:r>
+                    </m:oMath>
+                  </m:oMathPara>
+                </a14:m>
+                <a:endParaRPr lang="en-US" altLang="ko-KR" i="1" dirty="0">
+                  <a:latin typeface="Cambria Math" panose="02040503050406030204" pitchFamily="18" charset="0"/>
+                </a:endParaRPr>
+              </a:p>
+              <a:p>
+                <a:pPr/>
+                <a14:m>
+                  <m:oMathPara xmlns:m="http://schemas.openxmlformats.org/officeDocument/2006/math">
+                    <m:oMathParaPr>
+                      <m:jc m:val="left"/>
+                    </m:oMathParaPr>
+                    <m:oMath xmlns:m="http://schemas.openxmlformats.org/officeDocument/2006/math">
+                      <m:r>
+                        <a:rPr lang="ko-KR" altLang="en-US" i="1">
+                          <a:latin typeface="Cambria Math" panose="02040503050406030204" pitchFamily="18" charset="0"/>
+                        </a:rPr>
+                        <m:t>𝜃</m:t>
+                      </m:r>
+                      <m:r>
+                        <a:rPr lang="en-US" altLang="ko-KR" i="1">
+                          <a:latin typeface="Cambria Math" panose="02040503050406030204" pitchFamily="18" charset="0"/>
+                        </a:rPr>
+                        <m:t>=</m:t>
+                      </m:r>
+                      <m:r>
                         <m:rPr>
                           <m:sty m:val="p"/>
                         </m:rPr>
-                        <a:rPr lang="en-US" altLang="ko-KR" b="0" i="0" smtClean="0">
-                          <a:latin typeface="Cambria Math" panose="02040503050406030204" pitchFamily="18" charset="0"/>
-                        </a:rPr>
-                        <m:t>x</m:t>
-                      </m:r>
-                      <m:r>
-                        <a:rPr lang="en-US" altLang="ko-KR" b="0" i="0" smtClean="0">
-                          <a:latin typeface="Cambria Math" panose="02040503050406030204" pitchFamily="18" charset="0"/>
-                        </a:rPr>
-                        <m:t>′= </m:t>
-                      </m:r>
-                      <m:r>
-                        <m:rPr>
-                          <m:sty m:val="p"/>
-                        </m:rPr>
-                        <a:rPr lang="en-US" altLang="ko-KR" b="0" i="0" smtClean="0">
-                          <a:latin typeface="Cambria Math" panose="02040503050406030204" pitchFamily="18" charset="0"/>
-                        </a:rPr>
-                        <m:t>r</m:t>
-                      </m:r>
-                      <m:r>
-                        <a:rPr lang="en-US" altLang="ko-KR" b="0" i="0" smtClean="0">
-                          <a:latin typeface="Cambria Math" panose="02040503050406030204" pitchFamily="18" charset="0"/>
-                        </a:rPr>
-                        <m:t>′∗</m:t>
-                      </m:r>
-                      <m:r>
-                        <m:rPr>
-                          <m:sty m:val="p"/>
-                        </m:rPr>
-                        <a:rPr lang="en-US" altLang="ko-KR" b="0" i="0" smtClean="0">
-                          <a:latin typeface="Cambria Math" panose="02040503050406030204" pitchFamily="18" charset="0"/>
-                        </a:rPr>
-                        <m:t>cos</m:t>
-                      </m:r>
-                      <m:r>
-                        <a:rPr lang="ko-KR" altLang="en-US" i="1" smtClean="0">
-                          <a:latin typeface="Cambria Math" panose="02040503050406030204" pitchFamily="18" charset="0"/>
-                        </a:rPr>
-                        <m:t>𝜃</m:t>
+                        <a:rPr lang="en-US" altLang="ko-KR">
+                          <a:latin typeface="Cambria Math" panose="02040503050406030204" pitchFamily="18" charset="0"/>
+                        </a:rPr>
+                        <m:t>atan</m:t>
+                      </m:r>
+                      <m:r>
+                        <a:rPr lang="en-US" altLang="ko-KR">
+                          <a:latin typeface="Cambria Math" panose="02040503050406030204" pitchFamily="18" charset="0"/>
+                        </a:rPr>
+                        <m:t>2</m:t>
+                      </m:r>
+                      <m:r>
+                        <a:rPr lang="en-US" altLang="ko-KR" i="1">
+                          <a:latin typeface="Cambria Math" panose="02040503050406030204" pitchFamily="18" charset="0"/>
+                        </a:rPr>
+                        <m:t>⁡(</m:t>
+                      </m:r>
+                      <m:r>
+                        <a:rPr lang="en-US" altLang="ko-KR" i="1">
+                          <a:latin typeface="Cambria Math" panose="02040503050406030204" pitchFamily="18" charset="0"/>
+                        </a:rPr>
+                        <m:t>𝑦</m:t>
+                      </m:r>
+                      <m:r>
+                        <a:rPr lang="en-US" altLang="ko-KR" i="1">
+                          <a:latin typeface="Cambria Math" panose="02040503050406030204" pitchFamily="18" charset="0"/>
+                        </a:rPr>
+                        <m:t>, </m:t>
+                      </m:r>
+                      <m:r>
+                        <a:rPr lang="en-US" altLang="ko-KR" i="1">
+                          <a:latin typeface="Cambria Math" panose="02040503050406030204" pitchFamily="18" charset="0"/>
+                        </a:rPr>
+                        <m:t>𝑥</m:t>
+                      </m:r>
+                      <m:r>
+                        <a:rPr lang="en-US" altLang="ko-KR" i="1">
+                          <a:latin typeface="Cambria Math" panose="02040503050406030204" pitchFamily="18" charset="0"/>
+                        </a:rPr>
+                        <m:t>)</m:t>
                       </m:r>
                     </m:oMath>
                   </m:oMathPara>
                 </a14:m>
-                <a:endParaRPr lang="en-US" altLang="ko-KR" dirty="0"/>
+                <a:endParaRPr lang="en-US" altLang="ko-KR" dirty="0">
+                  <a:latin typeface="Cambria Math" panose="02040503050406030204" pitchFamily="18" charset="0"/>
+                </a:endParaRPr>
+              </a:p>
+              <a:p>
+                <a:pPr/>
+                <a:endParaRPr lang="en-US" altLang="ko-KR" dirty="0">
+                  <a:latin typeface="Cambria Math" panose="02040503050406030204" pitchFamily="18" charset="0"/>
+                </a:endParaRPr>
+              </a:p>
+              <a:p>
+                <a:r>
+                  <a:rPr lang="ko-KR" altLang="en-US" dirty="0">
+                    <a:latin typeface="Cambria Math" panose="02040503050406030204" pitchFamily="18" charset="0"/>
+                  </a:rPr>
+                  <a:t>벡터의 길이 구하기</a:t>
+                </a:r>
+                <a:endParaRPr lang="en-US" altLang="ko-KR" dirty="0">
+                  <a:latin typeface="Cambria Math" panose="02040503050406030204" pitchFamily="18" charset="0"/>
+                </a:endParaRPr>
+              </a:p>
+              <a:p>
+                <a:pPr/>
+                <a14:m>
+                  <m:oMathPara xmlns:m="http://schemas.openxmlformats.org/officeDocument/2006/math">
+                    <m:oMathParaPr>
+                      <m:jc m:val="left"/>
+                    </m:oMathParaPr>
+                    <m:oMath xmlns:m="http://schemas.openxmlformats.org/officeDocument/2006/math">
+                      <m:r>
+                        <a:rPr lang="en-US" altLang="ko-KR" b="0" i="1" smtClean="0">
+                          <a:latin typeface="Cambria Math" panose="02040503050406030204" pitchFamily="18" charset="0"/>
+                        </a:rPr>
+                        <m:t>𝑟</m:t>
+                      </m:r>
+                      <m:r>
+                        <a:rPr lang="en-US" altLang="ko-KR" b="0" i="1" smtClean="0">
+                          <a:latin typeface="Cambria Math" panose="02040503050406030204" pitchFamily="18" charset="0"/>
+                        </a:rPr>
+                        <m:t>=</m:t>
+                      </m:r>
+                      <m:rad>
+                        <m:radPr>
+                          <m:degHide m:val="on"/>
+                          <m:ctrlPr>
+                            <a:rPr lang="en-US" altLang="ko-KR" b="0" i="1" smtClean="0">
+                              <a:latin typeface="Cambria Math" panose="02040503050406030204" pitchFamily="18" charset="0"/>
+                            </a:rPr>
+                          </m:ctrlPr>
+                        </m:radPr>
+                        <m:deg/>
+                        <m:e>
+                          <m:sSup>
+                            <m:sSupPr>
+                              <m:ctrlPr>
+                                <a:rPr lang="en-US" altLang="ko-KR" b="0" i="1" smtClean="0">
+                                  <a:latin typeface="Cambria Math" panose="02040503050406030204" pitchFamily="18" charset="0"/>
+                                </a:rPr>
+                              </m:ctrlPr>
+                            </m:sSupPr>
+                            <m:e>
+                              <m:r>
+                                <a:rPr lang="en-US" altLang="ko-KR" b="0" i="1" smtClean="0">
+                                  <a:latin typeface="Cambria Math" panose="02040503050406030204" pitchFamily="18" charset="0"/>
+                                </a:rPr>
+                                <m:t>𝑥</m:t>
+                              </m:r>
+                            </m:e>
+                            <m:sup>
+                              <m:r>
+                                <a:rPr lang="en-US" altLang="ko-KR" b="0" i="1" smtClean="0">
+                                  <a:latin typeface="Cambria Math" panose="02040503050406030204" pitchFamily="18" charset="0"/>
+                                </a:rPr>
+                                <m:t>2</m:t>
+                              </m:r>
+                            </m:sup>
+                          </m:sSup>
+                          <m:r>
+                            <a:rPr lang="en-US" altLang="ko-KR" b="0" i="1" smtClean="0">
+                              <a:latin typeface="Cambria Math" panose="02040503050406030204" pitchFamily="18" charset="0"/>
+                            </a:rPr>
+                            <m:t>+</m:t>
+                          </m:r>
+                          <m:sSup>
+                            <m:sSupPr>
+                              <m:ctrlPr>
+                                <a:rPr lang="en-US" altLang="ko-KR" b="0" i="1" smtClean="0">
+                                  <a:latin typeface="Cambria Math" panose="02040503050406030204" pitchFamily="18" charset="0"/>
+                                </a:rPr>
+                              </m:ctrlPr>
+                            </m:sSupPr>
+                            <m:e>
+                              <m:r>
+                                <a:rPr lang="en-US" altLang="ko-KR" b="0" i="1" smtClean="0">
+                                  <a:latin typeface="Cambria Math" panose="02040503050406030204" pitchFamily="18" charset="0"/>
+                                </a:rPr>
+                                <m:t>𝑦</m:t>
+                              </m:r>
+                            </m:e>
+                            <m:sup>
+                              <m:r>
+                                <a:rPr lang="en-US" altLang="ko-KR" b="0" i="1" smtClean="0">
+                                  <a:latin typeface="Cambria Math" panose="02040503050406030204" pitchFamily="18" charset="0"/>
+                                </a:rPr>
+                                <m:t>2</m:t>
+                              </m:r>
+                            </m:sup>
+                          </m:sSup>
+                        </m:e>
+                      </m:rad>
+                    </m:oMath>
+                  </m:oMathPara>
+                </a14:m>
+                <a:endParaRPr lang="en-US" altLang="ko-KR" dirty="0">
+                  <a:latin typeface="Cambria Math" panose="02040503050406030204" pitchFamily="18" charset="0"/>
+                </a:endParaRPr>
+              </a:p>
+              <a:p>
+                <a:pPr/>
+                <a:endParaRPr lang="en-US" altLang="ko-KR" dirty="0">
+                  <a:latin typeface="Cambria Math" panose="02040503050406030204" pitchFamily="18" charset="0"/>
+                </a:endParaRPr>
+              </a:p>
+              <a:p>
+                <a:pPr/>
+                <a:r>
+                  <a:rPr lang="ko-KR" altLang="en-US" dirty="0">
+                    <a:latin typeface="Cambria Math" panose="02040503050406030204" pitchFamily="18" charset="0"/>
+                  </a:rPr>
+                  <a:t>단위 벡터로 변환</a:t>
+                </a:r>
+                <a:endParaRPr lang="en-US" altLang="ko-KR" dirty="0">
+                  <a:latin typeface="Cambria Math" panose="02040503050406030204" pitchFamily="18" charset="0"/>
+                </a:endParaRPr>
+              </a:p>
+              <a:p>
+                <a:pPr/>
+                <a:r>
+                  <a:rPr lang="en-US" altLang="ko-KR" dirty="0">
+                    <a:latin typeface="Cambria Math" panose="02040503050406030204" pitchFamily="18" charset="0"/>
+                  </a:rPr>
+                  <a:t>Vector = vector / r</a:t>
+                </a:r>
+              </a:p>
+              <a:p>
+                <a:pPr/>
+                <a:endParaRPr lang="en-US" altLang="ko-KR" dirty="0">
+                  <a:latin typeface="Cambria Math" panose="02040503050406030204" pitchFamily="18" charset="0"/>
+                </a:endParaRPr>
+              </a:p>
+              <a:p>
+                <a:pPr/>
+                <a:r>
+                  <a:rPr lang="ko-KR" altLang="en-US" dirty="0">
+                    <a:latin typeface="Cambria Math" panose="02040503050406030204" pitchFamily="18" charset="0"/>
+                  </a:rPr>
+                  <a:t>단위 벡터에 스칼라</a:t>
+                </a:r>
+                <a:r>
+                  <a:rPr lang="en-US" altLang="ko-KR" dirty="0">
+                    <a:latin typeface="Cambria Math" panose="02040503050406030204" pitchFamily="18" charset="0"/>
+                  </a:rPr>
+                  <a:t>k</a:t>
+                </a:r>
+                <a:r>
+                  <a:rPr lang="ko-KR" altLang="en-US" dirty="0">
+                    <a:latin typeface="Cambria Math" panose="02040503050406030204" pitchFamily="18" charset="0"/>
+                  </a:rPr>
+                  <a:t>를 곱하여 스케일</a:t>
+                </a:r>
+                <a:endParaRPr lang="en-US" altLang="ko-KR" dirty="0">
+                  <a:latin typeface="Cambria Math" panose="02040503050406030204" pitchFamily="18" charset="0"/>
+                </a:endParaRPr>
+              </a:p>
+              <a:p>
+                <a:pPr/>
+                <a:r>
+                  <a:rPr lang="en-US" altLang="ko-KR" dirty="0">
+                    <a:latin typeface="Cambria Math" panose="02040503050406030204" pitchFamily="18" charset="0"/>
+                  </a:rPr>
+                  <a:t>Vector = </a:t>
+                </a:r>
+                <a:r>
+                  <a:rPr lang="en-US" altLang="ko-KR" dirty="0" err="1">
+                    <a:latin typeface="Cambria Math" panose="02040503050406030204" pitchFamily="18" charset="0"/>
+                  </a:rPr>
+                  <a:t>unitVector</a:t>
+                </a:r>
+                <a:r>
+                  <a:rPr lang="en-US" altLang="ko-KR" dirty="0">
+                    <a:latin typeface="Cambria Math" panose="02040503050406030204" pitchFamily="18" charset="0"/>
+                  </a:rPr>
+                  <a:t> * k</a:t>
+                </a:r>
+              </a:p>
+              <a:p>
+                <a:pPr/>
+                <a:endParaRPr lang="en-US" altLang="ko-KR" dirty="0">
+                  <a:latin typeface="Cambria Math" panose="02040503050406030204" pitchFamily="18" charset="0"/>
+                </a:endParaRPr>
+              </a:p>
+              <a:p>
+                <a:pPr/>
+                <a:r>
+                  <a:rPr lang="ko-KR" altLang="en-US" dirty="0">
+                    <a:latin typeface="Cambria Math" panose="02040503050406030204" pitchFamily="18" charset="0"/>
+                  </a:rPr>
+                  <a:t>월드 좌표계로 변환</a:t>
+                </a:r>
+                <a:endParaRPr lang="en-US" altLang="ko-KR" dirty="0">
+                  <a:latin typeface="Cambria Math" panose="02040503050406030204" pitchFamily="18" charset="0"/>
+                </a:endParaRPr>
+              </a:p>
+              <a:p>
+                <a:pPr/>
+                <a:r>
+                  <a:rPr lang="en-US" altLang="ko-KR" dirty="0">
+                    <a:latin typeface="Cambria Math" panose="02040503050406030204" pitchFamily="18" charset="0"/>
+                  </a:rPr>
+                  <a:t>Destination = center + Vector</a:t>
+                </a:r>
               </a:p>
             </p:txBody>
           </p:sp>
@@ -5071,16 +4746,16 @@
             </p:nvSpPr>
             <p:spPr>
               <a:xfrm>
-                <a:off x="4437931" y="444128"/>
-                <a:ext cx="2397131" cy="1258743"/>
+                <a:off x="3061070" y="187801"/>
+                <a:ext cx="3974165" cy="4870116"/>
               </a:xfrm>
               <a:prstGeom prst="rect">
                 <a:avLst/>
               </a:prstGeom>
               <a:blipFill>
-                <a:blip r:embed="rId5"/>
+                <a:blip r:embed="rId4"/>
                 <a:stretch>
-                  <a:fillRect l="-2036" t="-2913" r="-1527"/>
+                  <a:fillRect l="-1227" r="-613" b="-1001"/>
                 </a:stretch>
               </a:blipFill>
             </p:spPr>
@@ -5142,632 +4817,6 @@
           <a:p>
             <a:pPr algn="ctr"/>
             <a:endParaRPr lang="ko-KR" altLang="en-US"/>
-          </a:p>
-        </p:txBody>
-      </p:sp>
-      <p:grpSp>
-        <p:nvGrpSpPr>
-          <p:cNvPr id="50" name="그룹 49">
-            <a:extLst>
-              <a:ext uri="{FF2B5EF4-FFF2-40B4-BE49-F238E27FC236}">
-                <a16:creationId xmlns:a16="http://schemas.microsoft.com/office/drawing/2014/main" id="{800226D5-3669-88AC-DE5D-AE740185436E}"/>
-              </a:ext>
-            </a:extLst>
-          </p:cNvPr>
-          <p:cNvGrpSpPr/>
-          <p:nvPr/>
-        </p:nvGrpSpPr>
-        <p:grpSpPr>
-          <a:xfrm>
-            <a:off x="8132511" y="433450"/>
-            <a:ext cx="1301336" cy="2578370"/>
-            <a:chOff x="2389900" y="433450"/>
-            <a:chExt cx="1301336" cy="2578370"/>
-          </a:xfrm>
-        </p:grpSpPr>
-        <p:sp>
-          <p:nvSpPr>
-            <p:cNvPr id="51" name="직사각형 50">
-              <a:extLst>
-                <a:ext uri="{FF2B5EF4-FFF2-40B4-BE49-F238E27FC236}">
-                  <a16:creationId xmlns:a16="http://schemas.microsoft.com/office/drawing/2014/main" id="{C05BA55F-8E67-D88E-E23B-22C504C3425F}"/>
-                </a:ext>
-              </a:extLst>
-            </p:cNvPr>
-            <p:cNvSpPr/>
-            <p:nvPr/>
-          </p:nvSpPr>
-          <p:spPr>
-            <a:xfrm>
-              <a:off x="3084110" y="924295"/>
-              <a:ext cx="380010" cy="380010"/>
-            </a:xfrm>
-            <a:prstGeom prst="rect">
-              <a:avLst/>
-            </a:prstGeom>
-          </p:spPr>
-          <p:style>
-            <a:lnRef idx="2">
-              <a:schemeClr val="accent2">
-                <a:shade val="50000"/>
-              </a:schemeClr>
-            </a:lnRef>
-            <a:fillRef idx="1">
-              <a:schemeClr val="accent2"/>
-            </a:fillRef>
-            <a:effectRef idx="0">
-              <a:schemeClr val="accent2"/>
-            </a:effectRef>
-            <a:fontRef idx="minor">
-              <a:schemeClr val="lt1"/>
-            </a:fontRef>
-          </p:style>
-          <p:txBody>
-            <a:bodyPr rtlCol="0" anchor="ctr"/>
-            <a:lstStyle/>
-            <a:p>
-              <a:pPr algn="ctr"/>
-              <a:endParaRPr lang="ko-KR" altLang="en-US"/>
-            </a:p>
-          </p:txBody>
-        </p:sp>
-        <p:sp>
-          <p:nvSpPr>
-            <p:cNvPr id="52" name="직사각형 51">
-              <a:extLst>
-                <a:ext uri="{FF2B5EF4-FFF2-40B4-BE49-F238E27FC236}">
-                  <a16:creationId xmlns:a16="http://schemas.microsoft.com/office/drawing/2014/main" id="{9D91F8E5-342D-D645-02A9-BA44B70F66A0}"/>
-                </a:ext>
-              </a:extLst>
-            </p:cNvPr>
-            <p:cNvSpPr/>
-            <p:nvPr/>
-          </p:nvSpPr>
-          <p:spPr>
-            <a:xfrm>
-              <a:off x="3311226" y="433450"/>
-              <a:ext cx="380010" cy="380010"/>
-            </a:xfrm>
-            <a:prstGeom prst="rect">
-              <a:avLst/>
-            </a:prstGeom>
-          </p:spPr>
-          <p:style>
-            <a:lnRef idx="2">
-              <a:schemeClr val="accent2">
-                <a:shade val="50000"/>
-              </a:schemeClr>
-            </a:lnRef>
-            <a:fillRef idx="1">
-              <a:schemeClr val="accent2"/>
-            </a:fillRef>
-            <a:effectRef idx="0">
-              <a:schemeClr val="accent2"/>
-            </a:effectRef>
-            <a:fontRef idx="minor">
-              <a:schemeClr val="lt1"/>
-            </a:fontRef>
-          </p:style>
-          <p:txBody>
-            <a:bodyPr rtlCol="0" anchor="ctr"/>
-            <a:lstStyle/>
-            <a:p>
-              <a:pPr algn="ctr"/>
-              <a:endParaRPr lang="ko-KR" altLang="en-US"/>
-            </a:p>
-          </p:txBody>
-        </p:sp>
-        <p:sp>
-          <p:nvSpPr>
-            <p:cNvPr id="53" name="직사각형 52">
-              <a:extLst>
-                <a:ext uri="{FF2B5EF4-FFF2-40B4-BE49-F238E27FC236}">
-                  <a16:creationId xmlns:a16="http://schemas.microsoft.com/office/drawing/2014/main" id="{0AD7E752-1253-CEA8-581D-9DFC3B938FF4}"/>
-                </a:ext>
-              </a:extLst>
-            </p:cNvPr>
-            <p:cNvSpPr/>
-            <p:nvPr/>
-          </p:nvSpPr>
-          <p:spPr>
-            <a:xfrm>
-              <a:off x="2412660" y="2456213"/>
-              <a:ext cx="380010" cy="380010"/>
-            </a:xfrm>
-            <a:prstGeom prst="rect">
-              <a:avLst/>
-            </a:prstGeom>
-          </p:spPr>
-          <p:style>
-            <a:lnRef idx="2">
-              <a:schemeClr val="accent1">
-                <a:shade val="50000"/>
-              </a:schemeClr>
-            </a:lnRef>
-            <a:fillRef idx="1">
-              <a:schemeClr val="accent1"/>
-            </a:fillRef>
-            <a:effectRef idx="0">
-              <a:schemeClr val="accent1"/>
-            </a:effectRef>
-            <a:fontRef idx="minor">
-              <a:schemeClr val="lt1"/>
-            </a:fontRef>
-          </p:style>
-          <p:txBody>
-            <a:bodyPr rtlCol="0" anchor="ctr"/>
-            <a:lstStyle/>
-            <a:p>
-              <a:pPr algn="ctr"/>
-              <a:endParaRPr lang="ko-KR" altLang="en-US"/>
-            </a:p>
-          </p:txBody>
-        </p:sp>
-        <p:cxnSp>
-          <p:nvCxnSpPr>
-            <p:cNvPr id="54" name="직선 화살표 연결선 53">
-              <a:extLst>
-                <a:ext uri="{FF2B5EF4-FFF2-40B4-BE49-F238E27FC236}">
-                  <a16:creationId xmlns:a16="http://schemas.microsoft.com/office/drawing/2014/main" id="{444F1015-2B48-15DB-39DA-4C6896813CBA}"/>
-                </a:ext>
-              </a:extLst>
-            </p:cNvPr>
-            <p:cNvCxnSpPr>
-              <a:cxnSpLocks/>
-            </p:cNvCxnSpPr>
-            <p:nvPr/>
-          </p:nvCxnSpPr>
-          <p:spPr>
-            <a:xfrm flipH="1">
-              <a:off x="2602665" y="1073499"/>
-              <a:ext cx="671450" cy="1572719"/>
-            </a:xfrm>
-            <a:prstGeom prst="straightConnector1">
-              <a:avLst/>
-            </a:prstGeom>
-            <a:ln>
-              <a:solidFill>
-                <a:srgbClr val="FF0000"/>
-              </a:solidFill>
-              <a:tailEnd type="triangle"/>
-            </a:ln>
-          </p:spPr>
-          <p:style>
-            <a:lnRef idx="1">
-              <a:schemeClr val="accent1"/>
-            </a:lnRef>
-            <a:fillRef idx="0">
-              <a:schemeClr val="accent1"/>
-            </a:fillRef>
-            <a:effectRef idx="0">
-              <a:schemeClr val="accent1"/>
-            </a:effectRef>
-            <a:fontRef idx="minor">
-              <a:schemeClr val="tx1"/>
-            </a:fontRef>
-          </p:style>
-        </p:cxnSp>
-        <p:cxnSp>
-          <p:nvCxnSpPr>
-            <p:cNvPr id="55" name="직선 화살표 연결선 54">
-              <a:extLst>
-                <a:ext uri="{FF2B5EF4-FFF2-40B4-BE49-F238E27FC236}">
-                  <a16:creationId xmlns:a16="http://schemas.microsoft.com/office/drawing/2014/main" id="{31114265-FDD8-3C72-B85A-2D12F8785FDE}"/>
-                </a:ext>
-              </a:extLst>
-            </p:cNvPr>
-            <p:cNvCxnSpPr>
-              <a:cxnSpLocks/>
-            </p:cNvCxnSpPr>
-            <p:nvPr/>
-          </p:nvCxnSpPr>
-          <p:spPr>
-            <a:xfrm>
-              <a:off x="3274115" y="1114300"/>
-              <a:ext cx="0" cy="1542805"/>
-            </a:xfrm>
-            <a:prstGeom prst="straightConnector1">
-              <a:avLst/>
-            </a:prstGeom>
-            <a:ln>
-              <a:solidFill>
-                <a:srgbClr val="FF0000"/>
-              </a:solidFill>
-              <a:tailEnd type="triangle"/>
-            </a:ln>
-          </p:spPr>
-          <p:style>
-            <a:lnRef idx="1">
-              <a:schemeClr val="accent1"/>
-            </a:lnRef>
-            <a:fillRef idx="0">
-              <a:schemeClr val="accent1"/>
-            </a:fillRef>
-            <a:effectRef idx="0">
-              <a:schemeClr val="accent1"/>
-            </a:effectRef>
-            <a:fontRef idx="minor">
-              <a:schemeClr val="tx1"/>
-            </a:fontRef>
-          </p:style>
-        </p:cxnSp>
-        <p:cxnSp>
-          <p:nvCxnSpPr>
-            <p:cNvPr id="56" name="직선 화살표 연결선 55">
-              <a:extLst>
-                <a:ext uri="{FF2B5EF4-FFF2-40B4-BE49-F238E27FC236}">
-                  <a16:creationId xmlns:a16="http://schemas.microsoft.com/office/drawing/2014/main" id="{23B0C8CB-AF36-40E2-759C-1360000300F9}"/>
-                </a:ext>
-              </a:extLst>
-            </p:cNvPr>
-            <p:cNvCxnSpPr>
-              <a:cxnSpLocks/>
-            </p:cNvCxnSpPr>
-            <p:nvPr/>
-          </p:nvCxnSpPr>
-          <p:spPr>
-            <a:xfrm flipH="1">
-              <a:off x="2602664" y="2646218"/>
-              <a:ext cx="657101" cy="0"/>
-            </a:xfrm>
-            <a:prstGeom prst="straightConnector1">
-              <a:avLst/>
-            </a:prstGeom>
-            <a:ln>
-              <a:solidFill>
-                <a:srgbClr val="FF0000"/>
-              </a:solidFill>
-              <a:tailEnd type="triangle"/>
-            </a:ln>
-          </p:spPr>
-          <p:style>
-            <a:lnRef idx="1">
-              <a:schemeClr val="accent1"/>
-            </a:lnRef>
-            <a:fillRef idx="0">
-              <a:schemeClr val="accent1"/>
-            </a:fillRef>
-            <a:effectRef idx="0">
-              <a:schemeClr val="accent1"/>
-            </a:effectRef>
-            <a:fontRef idx="minor">
-              <a:schemeClr val="tx1"/>
-            </a:fontRef>
-          </p:style>
-        </p:cxnSp>
-        <p:sp>
-          <p:nvSpPr>
-            <p:cNvPr id="57" name="원호 56">
-              <a:extLst>
-                <a:ext uri="{FF2B5EF4-FFF2-40B4-BE49-F238E27FC236}">
-                  <a16:creationId xmlns:a16="http://schemas.microsoft.com/office/drawing/2014/main" id="{08780FB6-DE0A-5FFC-3A0A-1DDD3A6367D9}"/>
-                </a:ext>
-              </a:extLst>
-            </p:cNvPr>
-            <p:cNvSpPr/>
-            <p:nvPr/>
-          </p:nvSpPr>
-          <p:spPr>
-            <a:xfrm>
-              <a:off x="2389900" y="2345378"/>
-              <a:ext cx="657100" cy="623454"/>
-            </a:xfrm>
-            <a:prstGeom prst="arc">
-              <a:avLst/>
-            </a:prstGeom>
-            <a:ln>
-              <a:solidFill>
-                <a:srgbClr val="FF0000"/>
-              </a:solidFill>
-            </a:ln>
-          </p:spPr>
-          <p:style>
-            <a:lnRef idx="1">
-              <a:schemeClr val="accent1"/>
-            </a:lnRef>
-            <a:fillRef idx="0">
-              <a:schemeClr val="accent1"/>
-            </a:fillRef>
-            <a:effectRef idx="0">
-              <a:schemeClr val="accent1"/>
-            </a:effectRef>
-            <a:fontRef idx="minor">
-              <a:schemeClr val="tx1"/>
-            </a:fontRef>
-          </p:style>
-          <p:txBody>
-            <a:bodyPr rtlCol="0" anchor="ctr"/>
-            <a:lstStyle/>
-            <a:p>
-              <a:pPr algn="ctr"/>
-              <a:endParaRPr lang="ko-KR" altLang="en-US"/>
-            </a:p>
-          </p:txBody>
-        </p:sp>
-        <p:sp>
-          <p:nvSpPr>
-            <p:cNvPr id="58" name="TextBox 57">
-              <a:extLst>
-                <a:ext uri="{FF2B5EF4-FFF2-40B4-BE49-F238E27FC236}">
-                  <a16:creationId xmlns:a16="http://schemas.microsoft.com/office/drawing/2014/main" id="{2E739C9F-C7EB-9CEE-07C0-E69D143C840D}"/>
-                </a:ext>
-              </a:extLst>
-            </p:cNvPr>
-            <p:cNvSpPr txBox="1"/>
-            <p:nvPr/>
-          </p:nvSpPr>
-          <p:spPr>
-            <a:xfrm>
-              <a:off x="2738427" y="1594250"/>
-              <a:ext cx="334066" cy="369332"/>
-            </a:xfrm>
-            <a:prstGeom prst="rect">
-              <a:avLst/>
-            </a:prstGeom>
-            <a:noFill/>
-          </p:spPr>
-          <p:txBody>
-            <a:bodyPr wrap="none" rtlCol="0">
-              <a:spAutoFit/>
-            </a:bodyPr>
-            <a:lstStyle/>
-            <a:p>
-              <a:r>
-                <a:rPr lang="en-US" altLang="ko-KR" dirty="0"/>
-                <a:t>r’</a:t>
-              </a:r>
-              <a:endParaRPr lang="ko-KR" altLang="en-US" dirty="0"/>
-            </a:p>
-          </p:txBody>
-        </p:sp>
-        <p:sp>
-          <p:nvSpPr>
-            <p:cNvPr id="59" name="TextBox 58">
-              <a:extLst>
-                <a:ext uri="{FF2B5EF4-FFF2-40B4-BE49-F238E27FC236}">
-                  <a16:creationId xmlns:a16="http://schemas.microsoft.com/office/drawing/2014/main" id="{5D580FDE-7C87-A1A0-163E-3EF7E7F124E3}"/>
-                </a:ext>
-              </a:extLst>
-            </p:cNvPr>
-            <p:cNvSpPr txBox="1"/>
-            <p:nvPr/>
-          </p:nvSpPr>
-          <p:spPr>
-            <a:xfrm>
-              <a:off x="3309038" y="1695593"/>
-              <a:ext cx="351378" cy="369332"/>
-            </a:xfrm>
-            <a:prstGeom prst="rect">
-              <a:avLst/>
-            </a:prstGeom>
-            <a:noFill/>
-          </p:spPr>
-          <p:txBody>
-            <a:bodyPr wrap="none" rtlCol="0">
-              <a:spAutoFit/>
-            </a:bodyPr>
-            <a:lstStyle/>
-            <a:p>
-              <a:r>
-                <a:rPr lang="en-US" altLang="ko-KR" dirty="0"/>
-                <a:t>y’</a:t>
-              </a:r>
-              <a:endParaRPr lang="ko-KR" altLang="en-US" dirty="0"/>
-            </a:p>
-          </p:txBody>
-        </p:sp>
-        <p:sp>
-          <p:nvSpPr>
-            <p:cNvPr id="60" name="TextBox 59">
-              <a:extLst>
-                <a:ext uri="{FF2B5EF4-FFF2-40B4-BE49-F238E27FC236}">
-                  <a16:creationId xmlns:a16="http://schemas.microsoft.com/office/drawing/2014/main" id="{651854E2-95F4-1142-623C-5824A64DD7DE}"/>
-                </a:ext>
-              </a:extLst>
-            </p:cNvPr>
-            <p:cNvSpPr txBox="1"/>
-            <p:nvPr/>
-          </p:nvSpPr>
-          <p:spPr>
-            <a:xfrm>
-              <a:off x="2881692" y="2642488"/>
-              <a:ext cx="344966" cy="369332"/>
-            </a:xfrm>
-            <a:prstGeom prst="rect">
-              <a:avLst/>
-            </a:prstGeom>
-            <a:noFill/>
-          </p:spPr>
-          <p:txBody>
-            <a:bodyPr wrap="none" rtlCol="0">
-              <a:spAutoFit/>
-            </a:bodyPr>
-            <a:lstStyle/>
-            <a:p>
-              <a:r>
-                <a:rPr lang="en-US" altLang="ko-KR" dirty="0"/>
-                <a:t>x’</a:t>
-              </a:r>
-              <a:endParaRPr lang="ko-KR" altLang="en-US" dirty="0"/>
-            </a:p>
-          </p:txBody>
-        </p:sp>
-        <mc:AlternateContent xmlns:mc="http://schemas.openxmlformats.org/markup-compatibility/2006">
-          <mc:Choice xmlns:a14="http://schemas.microsoft.com/office/drawing/2010/main" Requires="a14">
-            <p:sp>
-              <p:nvSpPr>
-                <p:cNvPr id="61" name="TextBox 60">
-                  <a:extLst>
-                    <a:ext uri="{FF2B5EF4-FFF2-40B4-BE49-F238E27FC236}">
-                      <a16:creationId xmlns:a16="http://schemas.microsoft.com/office/drawing/2014/main" id="{81333812-BD3B-DC47-D269-B3F6A17C210C}"/>
-                    </a:ext>
-                  </a:extLst>
-                </p:cNvPr>
-                <p:cNvSpPr txBox="1"/>
-                <p:nvPr/>
-              </p:nvSpPr>
-              <p:spPr>
-                <a:xfrm>
-                  <a:off x="2871599" y="2103900"/>
-                  <a:ext cx="278723" cy="369332"/>
-                </a:xfrm>
-                <a:prstGeom prst="rect">
-                  <a:avLst/>
-                </a:prstGeom>
-                <a:noFill/>
-              </p:spPr>
-              <p:txBody>
-                <a:bodyPr wrap="square">
-                  <a:spAutoFit/>
-                </a:bodyPr>
-                <a:lstStyle/>
-                <a:p>
-                  <a:pPr/>
-                  <a14:m>
-                    <m:oMathPara xmlns:m="http://schemas.openxmlformats.org/officeDocument/2006/math">
-                      <m:oMathParaPr>
-                        <m:jc m:val="centerGroup"/>
-                      </m:oMathParaPr>
-                      <m:oMath xmlns:m="http://schemas.openxmlformats.org/officeDocument/2006/math">
-                        <m:r>
-                          <a:rPr lang="ko-KR" altLang="en-US" i="1" smtClean="0">
-                            <a:latin typeface="Cambria Math" panose="02040503050406030204" pitchFamily="18" charset="0"/>
-                          </a:rPr>
-                          <m:t>𝜃</m:t>
-                        </m:r>
-                      </m:oMath>
-                    </m:oMathPara>
-                  </a14:m>
-                  <a:endParaRPr lang="ko-KR" altLang="en-US" dirty="0"/>
-                </a:p>
-              </p:txBody>
-            </p:sp>
-          </mc:Choice>
-          <mc:Fallback>
-            <p:sp>
-              <p:nvSpPr>
-                <p:cNvPr id="61" name="TextBox 60">
-                  <a:extLst>
-                    <a:ext uri="{FF2B5EF4-FFF2-40B4-BE49-F238E27FC236}">
-                      <a16:creationId xmlns:a16="http://schemas.microsoft.com/office/drawing/2014/main" id="{81333812-BD3B-DC47-D269-B3F6A17C210C}"/>
-                    </a:ext>
-                  </a:extLst>
-                </p:cNvPr>
-                <p:cNvSpPr txBox="1">
-                  <a:spLocks noRot="1" noChangeAspect="1" noMove="1" noResize="1" noEditPoints="1" noAdjustHandles="1" noChangeArrowheads="1" noChangeShapeType="1" noTextEdit="1"/>
-                </p:cNvSpPr>
-                <p:nvPr/>
-              </p:nvSpPr>
-              <p:spPr>
-                <a:xfrm>
-                  <a:off x="2871599" y="2103900"/>
-                  <a:ext cx="278723" cy="369332"/>
-                </a:xfrm>
-                <a:prstGeom prst="rect">
-                  <a:avLst/>
-                </a:prstGeom>
-                <a:blipFill>
-                  <a:blip r:embed="rId6"/>
-                  <a:stretch>
-                    <a:fillRect r="-8696"/>
-                  </a:stretch>
-                </a:blipFill>
-              </p:spPr>
-              <p:txBody>
-                <a:bodyPr/>
-                <a:lstStyle/>
-                <a:p>
-                  <a:r>
-                    <a:rPr lang="ko-KR" altLang="en-US">
-                      <a:noFill/>
-                    </a:rPr>
-                    <a:t> </a:t>
-                  </a:r>
-                </a:p>
-              </p:txBody>
-            </p:sp>
-          </mc:Fallback>
-        </mc:AlternateContent>
-      </p:grpSp>
-      <p:sp>
-        <p:nvSpPr>
-          <p:cNvPr id="63" name="화살표: 오른쪽 62">
-            <a:extLst>
-              <a:ext uri="{FF2B5EF4-FFF2-40B4-BE49-F238E27FC236}">
-                <a16:creationId xmlns:a16="http://schemas.microsoft.com/office/drawing/2014/main" id="{F20BF576-ED2F-C61D-6E68-B98F4DFEBDB9}"/>
-              </a:ext>
-            </a:extLst>
-          </p:cNvPr>
-          <p:cNvSpPr/>
-          <p:nvPr/>
-        </p:nvSpPr>
-        <p:spPr>
-          <a:xfrm>
-            <a:off x="7115786" y="1496066"/>
-            <a:ext cx="604099" cy="305996"/>
-          </a:xfrm>
-          <a:prstGeom prst="rightArrow">
-            <a:avLst/>
-          </a:prstGeom>
-        </p:spPr>
-        <p:style>
-          <a:lnRef idx="2">
-            <a:schemeClr val="accent1">
-              <a:shade val="50000"/>
-            </a:schemeClr>
-          </a:lnRef>
-          <a:fillRef idx="1">
-            <a:schemeClr val="accent1"/>
-          </a:fillRef>
-          <a:effectRef idx="0">
-            <a:schemeClr val="accent1"/>
-          </a:effectRef>
-          <a:fontRef idx="minor">
-            <a:schemeClr val="lt1"/>
-          </a:fontRef>
-        </p:style>
-        <p:txBody>
-          <a:bodyPr rtlCol="0" anchor="ctr"/>
-          <a:lstStyle/>
-          <a:p>
-            <a:pPr algn="ctr"/>
-            <a:endParaRPr lang="ko-KR" altLang="en-US"/>
-          </a:p>
-        </p:txBody>
-      </p:sp>
-      <p:sp>
-        <p:nvSpPr>
-          <p:cNvPr id="74" name="TextBox 73">
-            <a:extLst>
-              <a:ext uri="{FF2B5EF4-FFF2-40B4-BE49-F238E27FC236}">
-                <a16:creationId xmlns:a16="http://schemas.microsoft.com/office/drawing/2014/main" id="{1CB36922-F1A9-5602-02FA-2FCED4DF3FD7}"/>
-              </a:ext>
-            </a:extLst>
-          </p:cNvPr>
-          <p:cNvSpPr txBox="1"/>
-          <p:nvPr/>
-        </p:nvSpPr>
-        <p:spPr>
-          <a:xfrm>
-            <a:off x="3057233" y="1404223"/>
-            <a:ext cx="266420" cy="369332"/>
-          </a:xfrm>
-          <a:prstGeom prst="rect">
-            <a:avLst/>
-          </a:prstGeom>
-          <a:noFill/>
-        </p:spPr>
-        <p:txBody>
-          <a:bodyPr wrap="none" rtlCol="0">
-            <a:spAutoFit/>
-          </a:bodyPr>
-          <a:lstStyle/>
-          <a:p>
-            <a:r>
-              <a:rPr lang="en-US" altLang="ko-KR" dirty="0"/>
-              <a:t>r</a:t>
-            </a:r>
-            <a:endParaRPr lang="ko-KR" altLang="en-US" dirty="0"/>
           </a:p>
         </p:txBody>
       </p:sp>

</xml_diff>

<commit_message>
move an object along a vector
</commit_message>
<xml_diff>
--- a/Etc/두 점 사이 위치 계산.pptx
+++ b/Etc/두 점 사이 위치 계산.pptx
@@ -3326,423 +3326,6 @@
           <a:chExt cx="0" cy="0"/>
         </a:xfrm>
       </p:grpSpPr>
-      <mc:AlternateContent xmlns:mc="http://schemas.openxmlformats.org/markup-compatibility/2006">
-        <mc:Choice xmlns:a14="http://schemas.microsoft.com/office/drawing/2010/main" Requires="a14">
-          <p:sp>
-            <p:nvSpPr>
-              <p:cNvPr id="21" name="TextBox 20">
-                <a:extLst>
-                  <a:ext uri="{FF2B5EF4-FFF2-40B4-BE49-F238E27FC236}">
-                    <a16:creationId xmlns:a16="http://schemas.microsoft.com/office/drawing/2014/main" id="{65BC77C8-BDA9-3036-D36F-C1372E2FECB9}"/>
-                  </a:ext>
-                </a:extLst>
-              </p:cNvPr>
-              <p:cNvSpPr txBox="1"/>
-              <p:nvPr/>
-            </p:nvSpPr>
-            <p:spPr>
-              <a:xfrm>
-                <a:off x="302965" y="3506789"/>
-                <a:ext cx="1796517" cy="1812740"/>
-              </a:xfrm>
-              <a:prstGeom prst="rect">
-                <a:avLst/>
-              </a:prstGeom>
-              <a:noFill/>
-            </p:spPr>
-            <p:txBody>
-              <a:bodyPr wrap="none" rtlCol="0">
-                <a:spAutoFit/>
-              </a:bodyPr>
-              <a:lstStyle/>
-              <a:p>
-                <a:pPr/>
-                <a14:m>
-                  <m:oMathPara xmlns:m="http://schemas.openxmlformats.org/officeDocument/2006/math">
-                    <m:oMathParaPr>
-                      <m:jc m:val="centerGroup"/>
-                    </m:oMathParaPr>
-                    <m:oMath xmlns:m="http://schemas.openxmlformats.org/officeDocument/2006/math">
-                      <m:r>
-                        <m:rPr>
-                          <m:sty m:val="p"/>
-                        </m:rPr>
-                        <a:rPr lang="en-US" altLang="ko-KR" b="0" i="0" smtClean="0">
-                          <a:latin typeface="Cambria Math" panose="02040503050406030204" pitchFamily="18" charset="0"/>
-                        </a:rPr>
-                        <m:t>tan</m:t>
-                      </m:r>
-                      <m:r>
-                        <a:rPr lang="ko-KR" altLang="en-US" i="1" smtClean="0">
-                          <a:latin typeface="Cambria Math" panose="02040503050406030204" pitchFamily="18" charset="0"/>
-                        </a:rPr>
-                        <m:t>𝜃</m:t>
-                      </m:r>
-                      <m:r>
-                        <a:rPr lang="en-US" altLang="ko-KR" b="0" i="1" smtClean="0">
-                          <a:latin typeface="Cambria Math" panose="02040503050406030204" pitchFamily="18" charset="0"/>
-                        </a:rPr>
-                        <m:t>=</m:t>
-                      </m:r>
-                      <m:r>
-                        <a:rPr lang="en-US" altLang="ko-KR" b="0" i="1" smtClean="0">
-                          <a:latin typeface="Cambria Math" panose="02040503050406030204" pitchFamily="18" charset="0"/>
-                        </a:rPr>
-                        <m:t>𝑦</m:t>
-                      </m:r>
-                      <m:r>
-                        <a:rPr lang="en-US" altLang="ko-KR" b="0" i="1" smtClean="0">
-                          <a:latin typeface="Cambria Math" panose="02040503050406030204" pitchFamily="18" charset="0"/>
-                        </a:rPr>
-                        <m:t>/</m:t>
-                      </m:r>
-                      <m:r>
-                        <a:rPr lang="en-US" altLang="ko-KR" b="0" i="1" smtClean="0">
-                          <a:latin typeface="Cambria Math" panose="02040503050406030204" pitchFamily="18" charset="0"/>
-                        </a:rPr>
-                        <m:t>𝑥</m:t>
-                      </m:r>
-                    </m:oMath>
-                  </m:oMathPara>
-                </a14:m>
-                <a:endParaRPr lang="en-US" altLang="ko-KR" b="0" i="0" dirty="0">
-                  <a:latin typeface="Cambria Math" panose="02040503050406030204" pitchFamily="18" charset="0"/>
-                </a:endParaRPr>
-              </a:p>
-              <a:p>
-                <a:pPr/>
-                <a14:m>
-                  <m:oMathPara xmlns:m="http://schemas.openxmlformats.org/officeDocument/2006/math">
-                    <m:oMathParaPr>
-                      <m:jc m:val="centerGroup"/>
-                    </m:oMathParaPr>
-                    <m:oMath xmlns:m="http://schemas.openxmlformats.org/officeDocument/2006/math">
-                      <m:r>
-                        <a:rPr lang="ko-KR" altLang="en-US" i="1" smtClean="0">
-                          <a:latin typeface="Cambria Math" panose="02040503050406030204" pitchFamily="18" charset="0"/>
-                        </a:rPr>
-                        <m:t>𝜃</m:t>
-                      </m:r>
-                      <m:r>
-                        <a:rPr lang="en-US" altLang="ko-KR" b="0" i="1" smtClean="0">
-                          <a:latin typeface="Cambria Math" panose="02040503050406030204" pitchFamily="18" charset="0"/>
-                        </a:rPr>
-                        <m:t>=</m:t>
-                      </m:r>
-                      <m:r>
-                        <m:rPr>
-                          <m:sty m:val="p"/>
-                        </m:rPr>
-                        <a:rPr lang="en-US" altLang="ko-KR" b="0" i="0" smtClean="0">
-                          <a:latin typeface="Cambria Math" panose="02040503050406030204" pitchFamily="18" charset="0"/>
-                        </a:rPr>
-                        <m:t>atan</m:t>
-                      </m:r>
-                      <m:r>
-                        <a:rPr lang="en-US" altLang="ko-KR" b="0" i="0" smtClean="0">
-                          <a:latin typeface="Cambria Math" panose="02040503050406030204" pitchFamily="18" charset="0"/>
-                        </a:rPr>
-                        <m:t>2</m:t>
-                      </m:r>
-                      <m:r>
-                        <a:rPr lang="en-US" altLang="ko-KR" b="0" i="1" smtClean="0">
-                          <a:latin typeface="Cambria Math" panose="02040503050406030204" pitchFamily="18" charset="0"/>
-                        </a:rPr>
-                        <m:t>⁡(</m:t>
-                      </m:r>
-                      <m:r>
-                        <a:rPr lang="en-US" altLang="ko-KR" b="0" i="1" smtClean="0">
-                          <a:latin typeface="Cambria Math" panose="02040503050406030204" pitchFamily="18" charset="0"/>
-                        </a:rPr>
-                        <m:t>𝑦</m:t>
-                      </m:r>
-                      <m:r>
-                        <a:rPr lang="en-US" altLang="ko-KR" b="0" i="1" smtClean="0">
-                          <a:latin typeface="Cambria Math" panose="02040503050406030204" pitchFamily="18" charset="0"/>
-                        </a:rPr>
-                        <m:t>, </m:t>
-                      </m:r>
-                      <m:r>
-                        <a:rPr lang="en-US" altLang="ko-KR" b="0" i="1" smtClean="0">
-                          <a:latin typeface="Cambria Math" panose="02040503050406030204" pitchFamily="18" charset="0"/>
-                        </a:rPr>
-                        <m:t>𝑥</m:t>
-                      </m:r>
-                      <m:r>
-                        <a:rPr lang="en-US" altLang="ko-KR" b="0" i="1" smtClean="0">
-                          <a:latin typeface="Cambria Math" panose="02040503050406030204" pitchFamily="18" charset="0"/>
-                        </a:rPr>
-                        <m:t>)</m:t>
-                      </m:r>
-                    </m:oMath>
-                  </m:oMathPara>
-                </a14:m>
-                <a:endParaRPr lang="en-US" altLang="ko-KR" b="0" i="0" dirty="0">
-                  <a:latin typeface="Cambria Math" panose="02040503050406030204" pitchFamily="18" charset="0"/>
-                </a:endParaRPr>
-              </a:p>
-              <a:p>
-                <a:pPr/>
-                <a14:m>
-                  <m:oMathPara xmlns:m="http://schemas.openxmlformats.org/officeDocument/2006/math">
-                    <m:oMathParaPr>
-                      <m:jc m:val="centerGroup"/>
-                    </m:oMathParaPr>
-                    <m:oMath xmlns:m="http://schemas.openxmlformats.org/officeDocument/2006/math">
-                      <m:r>
-                        <a:rPr lang="en-US" altLang="ko-KR" b="0" i="1" smtClean="0">
-                          <a:latin typeface="Cambria Math" panose="02040503050406030204" pitchFamily="18" charset="0"/>
-                        </a:rPr>
-                        <m:t>𝑟</m:t>
-                      </m:r>
-                      <m:r>
-                        <a:rPr lang="en-US" altLang="ko-KR" b="0" i="1" smtClean="0">
-                          <a:latin typeface="Cambria Math" panose="02040503050406030204" pitchFamily="18" charset="0"/>
-                        </a:rPr>
-                        <m:t>=</m:t>
-                      </m:r>
-                      <m:rad>
-                        <m:radPr>
-                          <m:degHide m:val="on"/>
-                          <m:ctrlPr>
-                            <a:rPr lang="en-US" altLang="ko-KR" b="0" i="1" smtClean="0">
-                              <a:latin typeface="Cambria Math" panose="02040503050406030204" pitchFamily="18" charset="0"/>
-                            </a:rPr>
-                          </m:ctrlPr>
-                        </m:radPr>
-                        <m:deg/>
-                        <m:e>
-                          <m:sSup>
-                            <m:sSupPr>
-                              <m:ctrlPr>
-                                <a:rPr lang="en-US" altLang="ko-KR" b="0" i="1" smtClean="0">
-                                  <a:latin typeface="Cambria Math" panose="02040503050406030204" pitchFamily="18" charset="0"/>
-                                </a:rPr>
-                              </m:ctrlPr>
-                            </m:sSupPr>
-                            <m:e>
-                              <m:r>
-                                <a:rPr lang="en-US" altLang="ko-KR" b="0" i="1" smtClean="0">
-                                  <a:latin typeface="Cambria Math" panose="02040503050406030204" pitchFamily="18" charset="0"/>
-                                </a:rPr>
-                                <m:t>𝑥</m:t>
-                              </m:r>
-                            </m:e>
-                            <m:sup>
-                              <m:r>
-                                <a:rPr lang="en-US" altLang="ko-KR" b="0" i="1" smtClean="0">
-                                  <a:latin typeface="Cambria Math" panose="02040503050406030204" pitchFamily="18" charset="0"/>
-                                </a:rPr>
-                                <m:t>2</m:t>
-                              </m:r>
-                            </m:sup>
-                          </m:sSup>
-                          <m:r>
-                            <a:rPr lang="en-US" altLang="ko-KR" b="0" i="1" smtClean="0">
-                              <a:latin typeface="Cambria Math" panose="02040503050406030204" pitchFamily="18" charset="0"/>
-                            </a:rPr>
-                            <m:t>+</m:t>
-                          </m:r>
-                          <m:sSup>
-                            <m:sSupPr>
-                              <m:ctrlPr>
-                                <a:rPr lang="en-US" altLang="ko-KR" b="0" i="1" smtClean="0">
-                                  <a:latin typeface="Cambria Math" panose="02040503050406030204" pitchFamily="18" charset="0"/>
-                                </a:rPr>
-                              </m:ctrlPr>
-                            </m:sSupPr>
-                            <m:e>
-                              <m:r>
-                                <a:rPr lang="en-US" altLang="ko-KR" b="0" i="1" smtClean="0">
-                                  <a:latin typeface="Cambria Math" panose="02040503050406030204" pitchFamily="18" charset="0"/>
-                                </a:rPr>
-                                <m:t>𝑦</m:t>
-                              </m:r>
-                            </m:e>
-                            <m:sup>
-                              <m:r>
-                                <a:rPr lang="en-US" altLang="ko-KR" b="0" i="1" smtClean="0">
-                                  <a:latin typeface="Cambria Math" panose="02040503050406030204" pitchFamily="18" charset="0"/>
-                                </a:rPr>
-                                <m:t>2</m:t>
-                              </m:r>
-                            </m:sup>
-                          </m:sSup>
-                        </m:e>
-                      </m:rad>
-                    </m:oMath>
-                  </m:oMathPara>
-                </a14:m>
-                <a:endParaRPr lang="en-US" altLang="ko-KR" dirty="0">
-                  <a:latin typeface="Cambria Math" panose="02040503050406030204" pitchFamily="18" charset="0"/>
-                </a:endParaRPr>
-              </a:p>
-              <a:p>
-                <a:endParaRPr lang="en-US" altLang="ko-KR" b="0" i="0" dirty="0">
-                  <a:latin typeface="Cambria Math" panose="02040503050406030204" pitchFamily="18" charset="0"/>
-                </a:endParaRPr>
-              </a:p>
-              <a:p>
-                <a:pPr/>
-                <a14:m>
-                  <m:oMathPara xmlns:m="http://schemas.openxmlformats.org/officeDocument/2006/math">
-                    <m:oMathParaPr>
-                      <m:jc m:val="centerGroup"/>
-                    </m:oMathParaPr>
-                    <m:oMath xmlns:m="http://schemas.openxmlformats.org/officeDocument/2006/math">
-                      <m:r>
-                        <m:rPr>
-                          <m:sty m:val="p"/>
-                        </m:rPr>
-                        <a:rPr lang="en-US" altLang="ko-KR" b="0" i="0" smtClean="0">
-                          <a:latin typeface="Cambria Math" panose="02040503050406030204" pitchFamily="18" charset="0"/>
-                        </a:rPr>
-                        <m:t>x</m:t>
-                      </m:r>
-                      <m:r>
-                        <a:rPr lang="en-US" altLang="ko-KR" b="0" i="0" smtClean="0">
-                          <a:latin typeface="Cambria Math" panose="02040503050406030204" pitchFamily="18" charset="0"/>
-                        </a:rPr>
-                        <m:t>= </m:t>
-                      </m:r>
-                      <m:r>
-                        <m:rPr>
-                          <m:sty m:val="p"/>
-                        </m:rPr>
-                        <a:rPr lang="en-US" altLang="ko-KR" b="0" i="0" smtClean="0">
-                          <a:latin typeface="Cambria Math" panose="02040503050406030204" pitchFamily="18" charset="0"/>
-                        </a:rPr>
-                        <m:t>r</m:t>
-                      </m:r>
-                      <m:r>
-                        <a:rPr lang="en-US" altLang="ko-KR" b="0" i="0" smtClean="0">
-                          <a:latin typeface="Cambria Math" panose="02040503050406030204" pitchFamily="18" charset="0"/>
-                        </a:rPr>
-                        <m:t>∗</m:t>
-                      </m:r>
-                      <m:r>
-                        <m:rPr>
-                          <m:sty m:val="p"/>
-                        </m:rPr>
-                        <a:rPr lang="en-US" altLang="ko-KR" b="0" i="0" smtClean="0">
-                          <a:latin typeface="Cambria Math" panose="02040503050406030204" pitchFamily="18" charset="0"/>
-                        </a:rPr>
-                        <m:t>cos</m:t>
-                      </m:r>
-                      <m:r>
-                        <a:rPr lang="ko-KR" altLang="en-US" i="1" smtClean="0">
-                          <a:latin typeface="Cambria Math" panose="02040503050406030204" pitchFamily="18" charset="0"/>
-                        </a:rPr>
-                        <m:t>𝜃</m:t>
-                      </m:r>
-                    </m:oMath>
-                  </m:oMathPara>
-                </a14:m>
-                <a:endParaRPr lang="en-US" altLang="ko-KR" dirty="0"/>
-              </a:p>
-              <a:p>
-                <a:pPr/>
-                <a14:m>
-                  <m:oMathPara xmlns:m="http://schemas.openxmlformats.org/officeDocument/2006/math">
-                    <m:oMathParaPr>
-                      <m:jc m:val="centerGroup"/>
-                    </m:oMathParaPr>
-                    <m:oMath xmlns:m="http://schemas.openxmlformats.org/officeDocument/2006/math">
-                      <m:r>
-                        <m:rPr>
-                          <m:sty m:val="p"/>
-                        </m:rPr>
-                        <a:rPr lang="en-US" altLang="ko-KR" b="0" i="0" smtClean="0">
-                          <a:latin typeface="Cambria Math" panose="02040503050406030204" pitchFamily="18" charset="0"/>
-                        </a:rPr>
-                        <m:t>y</m:t>
-                      </m:r>
-                      <m:r>
-                        <a:rPr lang="en-US" altLang="ko-KR" b="0" i="0" smtClean="0">
-                          <a:latin typeface="Cambria Math" panose="02040503050406030204" pitchFamily="18" charset="0"/>
-                        </a:rPr>
-                        <m:t>= </m:t>
-                      </m:r>
-                      <m:r>
-                        <m:rPr>
-                          <m:sty m:val="p"/>
-                        </m:rPr>
-                        <a:rPr lang="en-US" altLang="ko-KR" b="0" i="0" smtClean="0">
-                          <a:latin typeface="Cambria Math" panose="02040503050406030204" pitchFamily="18" charset="0"/>
-                        </a:rPr>
-                        <m:t>r</m:t>
-                      </m:r>
-                      <m:r>
-                        <a:rPr lang="en-US" altLang="ko-KR" b="0" i="0" smtClean="0">
-                          <a:latin typeface="Cambria Math" panose="02040503050406030204" pitchFamily="18" charset="0"/>
-                        </a:rPr>
-                        <m:t>∗</m:t>
-                      </m:r>
-                      <m:r>
-                        <a:rPr lang="en-US" altLang="ko-KR" b="0" i="1" smtClean="0">
-                          <a:latin typeface="Cambria Math" panose="02040503050406030204" pitchFamily="18" charset="0"/>
-                        </a:rPr>
-                        <m:t>𝑠𝑖𝑛</m:t>
-                      </m:r>
-                      <m:r>
-                        <a:rPr lang="ko-KR" altLang="en-US" i="1" smtClean="0">
-                          <a:latin typeface="Cambria Math" panose="02040503050406030204" pitchFamily="18" charset="0"/>
-                        </a:rPr>
-                        <m:t>𝜃</m:t>
-                      </m:r>
-                    </m:oMath>
-                  </m:oMathPara>
-                </a14:m>
-                <a:endParaRPr lang="ko-KR" altLang="en-US" dirty="0"/>
-              </a:p>
-            </p:txBody>
-          </p:sp>
-        </mc:Choice>
-        <mc:Fallback>
-          <p:sp>
-            <p:nvSpPr>
-              <p:cNvPr id="21" name="TextBox 20">
-                <a:extLst>
-                  <a:ext uri="{FF2B5EF4-FFF2-40B4-BE49-F238E27FC236}">
-                    <a16:creationId xmlns:a16="http://schemas.microsoft.com/office/drawing/2014/main" id="{65BC77C8-BDA9-3036-D36F-C1372E2FECB9}"/>
-                  </a:ext>
-                </a:extLst>
-              </p:cNvPr>
-              <p:cNvSpPr txBox="1">
-                <a:spLocks noRot="1" noChangeAspect="1" noMove="1" noResize="1" noEditPoints="1" noAdjustHandles="1" noChangeArrowheads="1" noChangeShapeType="1" noTextEdit="1"/>
-              </p:cNvSpPr>
-              <p:nvPr/>
-            </p:nvSpPr>
-            <p:spPr>
-              <a:xfrm>
-                <a:off x="302965" y="3506789"/>
-                <a:ext cx="1796517" cy="1812740"/>
-              </a:xfrm>
-              <a:prstGeom prst="rect">
-                <a:avLst/>
-              </a:prstGeom>
-              <a:blipFill>
-                <a:blip r:embed="rId2"/>
-                <a:stretch>
-                  <a:fillRect b="-1007"/>
-                </a:stretch>
-              </a:blipFill>
-            </p:spPr>
-            <p:txBody>
-              <a:bodyPr/>
-              <a:lstStyle/>
-              <a:p>
-                <a:r>
-                  <a:rPr lang="ko-KR" altLang="en-US">
-                    <a:noFill/>
-                  </a:rPr>
-                  <a:t> </a:t>
-                </a:r>
-              </a:p>
-            </p:txBody>
-          </p:sp>
-        </mc:Fallback>
-      </mc:AlternateContent>
       <p:grpSp>
         <p:nvGrpSpPr>
           <p:cNvPr id="48" name="그룹 47">
@@ -3757,10 +3340,10 @@
         </p:nvGrpSpPr>
         <p:grpSpPr>
           <a:xfrm>
-            <a:off x="246414" y="433450"/>
-            <a:ext cx="1473336" cy="2558741"/>
-            <a:chOff x="246414" y="433450"/>
-            <a:chExt cx="1473336" cy="2558741"/>
+            <a:off x="269174" y="433450"/>
+            <a:ext cx="1450576" cy="2558741"/>
+            <a:chOff x="269174" y="433450"/>
+            <a:chExt cx="1450576" cy="2558741"/>
           </a:xfrm>
         </p:grpSpPr>
         <p:sp>
@@ -3886,21 +3469,18 @@
               <a:avLst/>
             </a:prstGeom>
             <a:ln>
-              <a:solidFill>
-                <a:srgbClr val="FF0000"/>
-              </a:solidFill>
               <a:tailEnd type="triangle"/>
             </a:ln>
           </p:spPr>
           <p:style>
             <a:lnRef idx="1">
-              <a:schemeClr val="accent1"/>
+              <a:schemeClr val="dk1"/>
             </a:lnRef>
             <a:fillRef idx="0">
-              <a:schemeClr val="accent1"/>
+              <a:schemeClr val="dk1"/>
             </a:fillRef>
             <a:effectRef idx="0">
-              <a:schemeClr val="accent1"/>
+              <a:schemeClr val="dk1"/>
             </a:effectRef>
             <a:fontRef idx="minor">
               <a:schemeClr val="tx1"/>
@@ -3930,21 +3510,18 @@
               <a:avLst/>
             </a:prstGeom>
             <a:ln>
-              <a:solidFill>
-                <a:srgbClr val="FF0000"/>
-              </a:solidFill>
               <a:tailEnd type="triangle"/>
             </a:ln>
           </p:spPr>
           <p:style>
             <a:lnRef idx="1">
-              <a:schemeClr val="accent1"/>
+              <a:schemeClr val="dk1"/>
             </a:lnRef>
             <a:fillRef idx="0">
-              <a:schemeClr val="accent1"/>
+              <a:schemeClr val="dk1"/>
             </a:fillRef>
             <a:effectRef idx="0">
-              <a:schemeClr val="accent1"/>
+              <a:schemeClr val="dk1"/>
             </a:effectRef>
             <a:fontRef idx="minor">
               <a:schemeClr val="tx1"/>
@@ -3974,76 +3551,24 @@
               <a:avLst/>
             </a:prstGeom>
             <a:ln>
-              <a:solidFill>
-                <a:srgbClr val="FF0000"/>
-              </a:solidFill>
               <a:tailEnd type="triangle"/>
             </a:ln>
           </p:spPr>
           <p:style>
             <a:lnRef idx="1">
-              <a:schemeClr val="accent1"/>
+              <a:schemeClr val="dk1"/>
             </a:lnRef>
             <a:fillRef idx="0">
-              <a:schemeClr val="accent1"/>
+              <a:schemeClr val="dk1"/>
             </a:fillRef>
             <a:effectRef idx="0">
-              <a:schemeClr val="accent1"/>
+              <a:schemeClr val="dk1"/>
             </a:effectRef>
             <a:fontRef idx="minor">
               <a:schemeClr val="tx1"/>
             </a:fontRef>
           </p:style>
         </p:cxnSp>
-        <p:sp>
-          <p:nvSpPr>
-            <p:cNvPr id="16" name="원호 15">
-              <a:extLst>
-                <a:ext uri="{FF2B5EF4-FFF2-40B4-BE49-F238E27FC236}">
-                  <a16:creationId xmlns:a16="http://schemas.microsoft.com/office/drawing/2014/main" id="{23153EE4-0AF8-4009-B8F1-2D0AE07245BE}"/>
-                </a:ext>
-              </a:extLst>
-            </p:cNvPr>
-            <p:cNvSpPr/>
-            <p:nvPr/>
-          </p:nvSpPr>
-          <p:spPr>
-            <a:xfrm>
-              <a:off x="246414" y="2345378"/>
-              <a:ext cx="657100" cy="623454"/>
-            </a:xfrm>
-            <a:prstGeom prst="arc">
-              <a:avLst/>
-            </a:prstGeom>
-            <a:ln>
-              <a:solidFill>
-                <a:srgbClr val="FF0000"/>
-              </a:solidFill>
-            </a:ln>
-          </p:spPr>
-          <p:style>
-            <a:lnRef idx="1">
-              <a:schemeClr val="accent1"/>
-            </a:lnRef>
-            <a:fillRef idx="0">
-              <a:schemeClr val="accent1"/>
-            </a:fillRef>
-            <a:effectRef idx="0">
-              <a:schemeClr val="accent1"/>
-            </a:effectRef>
-            <a:fontRef idx="minor">
-              <a:schemeClr val="tx1"/>
-            </a:fontRef>
-          </p:style>
-          <p:txBody>
-            <a:bodyPr rtlCol="0" anchor="ctr"/>
-            <a:lstStyle/>
-            <a:p>
-              <a:pPr algn="ctr"/>
-              <a:endParaRPr lang="ko-KR" altLang="en-US"/>
-            </a:p>
-          </p:txBody>
-        </p:sp>
         <p:sp>
           <p:nvSpPr>
             <p:cNvPr id="17" name="TextBox 16">
@@ -4152,102 +3677,6 @@
             </a:p>
           </p:txBody>
         </p:sp>
-        <mc:AlternateContent xmlns:mc="http://schemas.openxmlformats.org/markup-compatibility/2006" xmlns:a14="http://schemas.microsoft.com/office/drawing/2010/main">
-          <mc:Choice Requires="a14">
-            <p:sp>
-              <p:nvSpPr>
-                <p:cNvPr id="23" name="TextBox 22">
-                  <a:extLst>
-                    <a:ext uri="{FF2B5EF4-FFF2-40B4-BE49-F238E27FC236}">
-                      <a16:creationId xmlns:a16="http://schemas.microsoft.com/office/drawing/2014/main" id="{A95D83E5-D51A-C08A-5052-4B233EB614B4}"/>
-                    </a:ext>
-                  </a:extLst>
-                </p:cNvPr>
-                <p:cNvSpPr txBox="1"/>
-                <p:nvPr/>
-              </p:nvSpPr>
-              <p:spPr>
-                <a:xfrm>
-                  <a:off x="728113" y="2103900"/>
-                  <a:ext cx="278723" cy="369332"/>
-                </a:xfrm>
-                <a:prstGeom prst="rect">
-                  <a:avLst/>
-                </a:prstGeom>
-                <a:noFill/>
-              </p:spPr>
-              <p:txBody>
-                <a:bodyPr wrap="square">
-                  <a:spAutoFit/>
-                </a:bodyPr>
-                <a:lstStyle/>
-                <a:p>
-                  <a:pPr/>
-                  <a14:m>
-                    <m:oMathPara xmlns:m="http://schemas.openxmlformats.org/officeDocument/2006/math">
-                      <m:oMathParaPr>
-                        <m:jc m:val="centerGroup"/>
-                      </m:oMathParaPr>
-                      <m:oMath xmlns:m="http://schemas.openxmlformats.org/officeDocument/2006/math">
-                        <m:r>
-                          <a:rPr lang="ko-KR" altLang="en-US" i="1" smtClean="0">
-                            <a:latin typeface="Cambria Math" panose="02040503050406030204" pitchFamily="18" charset="0"/>
-                          </a:rPr>
-                          <m:t>𝜃</m:t>
-                        </m:r>
-                      </m:oMath>
-                    </m:oMathPara>
-                  </a14:m>
-                  <a:endParaRPr lang="ko-KR" altLang="en-US" dirty="0"/>
-                </a:p>
-              </p:txBody>
-            </p:sp>
-          </mc:Choice>
-          <mc:Fallback xmlns="">
-            <p:sp>
-              <p:nvSpPr>
-                <p:cNvPr id="23" name="TextBox 22">
-                  <a:extLst>
-                    <a:ext uri="{FF2B5EF4-FFF2-40B4-BE49-F238E27FC236}">
-                      <a16:creationId xmlns:a16="http://schemas.microsoft.com/office/drawing/2014/main" id="{A95D83E5-D51A-C08A-5052-4B233EB614B4}"/>
-                    </a:ext>
-                  </a:extLst>
-                </p:cNvPr>
-                <p:cNvSpPr txBox="1">
-                  <a:spLocks noRot="1" noChangeAspect="1" noMove="1" noResize="1" noEditPoints="1" noAdjustHandles="1" noChangeArrowheads="1" noChangeShapeType="1" noTextEdit="1"/>
-                </p:cNvSpPr>
-                <p:nvPr/>
-              </p:nvSpPr>
-              <p:spPr>
-                <a:xfrm>
-                  <a:off x="728113" y="2103900"/>
-                  <a:ext cx="278723" cy="369332"/>
-                </a:xfrm>
-                <a:prstGeom prst="rect">
-                  <a:avLst/>
-                </a:prstGeom>
-                <a:blipFill>
-                  <a:blip r:embed="rId3"/>
-                  <a:stretch>
-                    <a:fillRect r="-8696"/>
-                  </a:stretch>
-                </a:blipFill>
-              </p:spPr>
-              <p:txBody>
-                <a:bodyPr/>
-                <a:lstStyle/>
-                <a:p>
-                  <a:r>
-                    <a:rPr lang="ko-KR" altLang="en-US">
-                      <a:noFill/>
-                    </a:rPr>
-                    <a:t> </a:t>
-                  </a:r>
-                </a:p>
-              </p:txBody>
-            </p:sp>
-          </mc:Fallback>
-        </mc:AlternateContent>
       </p:grpSp>
       <mc:AlternateContent xmlns:mc="http://schemas.openxmlformats.org/markup-compatibility/2006">
         <mc:Choice xmlns:a14="http://schemas.microsoft.com/office/drawing/2010/main" Requires="a14">
@@ -4266,7 +3695,7 @@
             <p:spPr>
               <a:xfrm>
                 <a:off x="3061070" y="187801"/>
-                <a:ext cx="3974165" cy="4870116"/>
+                <a:ext cx="3974165" cy="4033925"/>
               </a:xfrm>
               <a:prstGeom prst="rect">
                 <a:avLst/>
@@ -4348,7 +3777,6 @@
                 </a:endParaRPr>
               </a:p>
               <a:p>
-                <a:pPr/>
                 <a:r>
                   <a:rPr lang="en-US" altLang="ko-KR" dirty="0"/>
                   <a:t>Vector = </a:t>
@@ -4386,130 +3814,6 @@
                 </a:endParaRPr>
               </a:p>
               <a:p>
-                <a:pPr/>
-                <a:endParaRPr lang="en-US" altLang="ko-KR" i="1" dirty="0">
-                  <a:latin typeface="Cambria Math" panose="02040503050406030204" pitchFamily="18" charset="0"/>
-                </a:endParaRPr>
-              </a:p>
-              <a:p>
-                <a:pPr/>
-                <a14:m>
-                  <m:oMathPara xmlns:m="http://schemas.openxmlformats.org/officeDocument/2006/math">
-                    <m:oMathParaPr>
-                      <m:jc m:val="left"/>
-                    </m:oMathParaPr>
-                    <m:oMath xmlns:m="http://schemas.openxmlformats.org/officeDocument/2006/math">
-                      <m:r>
-                        <a:rPr lang="ko-KR" altLang="en-US" i="1" smtClean="0">
-                          <a:latin typeface="Cambria Math" panose="02040503050406030204" pitchFamily="18" charset="0"/>
-                        </a:rPr>
-                        <m:t>𝜃</m:t>
-                      </m:r>
-                      <m:r>
-                        <a:rPr lang="en-US" altLang="ko-KR" b="0" i="0" smtClean="0">
-                          <a:latin typeface="Cambria Math" panose="02040503050406030204" pitchFamily="18" charset="0"/>
-                        </a:rPr>
-                        <m:t> </m:t>
-                      </m:r>
-                      <m:r>
-                        <a:rPr lang="ko-KR" altLang="en-US" i="1">
-                          <a:latin typeface="Cambria Math" panose="02040503050406030204" pitchFamily="18" charset="0"/>
-                        </a:rPr>
-                        <m:t>구</m:t>
-                      </m:r>
-                      <m:r>
-                        <a:rPr lang="ko-KR" altLang="en-US" i="1" smtClean="0">
-                          <a:latin typeface="Cambria Math" panose="02040503050406030204" pitchFamily="18" charset="0"/>
-                        </a:rPr>
-                        <m:t>하</m:t>
-                      </m:r>
-                      <m:r>
-                        <a:rPr lang="ko-KR" altLang="en-US" i="1">
-                          <a:latin typeface="Cambria Math" panose="02040503050406030204" pitchFamily="18" charset="0"/>
-                        </a:rPr>
-                        <m:t>기</m:t>
-                      </m:r>
-                    </m:oMath>
-                  </m:oMathPara>
-                </a14:m>
-                <a:endParaRPr lang="en-US" altLang="ko-KR" i="1" dirty="0">
-                  <a:latin typeface="Cambria Math" panose="02040503050406030204" pitchFamily="18" charset="0"/>
-                </a:endParaRPr>
-              </a:p>
-              <a:p>
-                <a:pPr/>
-                <a14:m>
-                  <m:oMathPara xmlns:m="http://schemas.openxmlformats.org/officeDocument/2006/math">
-                    <m:oMathParaPr>
-                      <m:jc m:val="left"/>
-                    </m:oMathParaPr>
-                    <m:oMath xmlns:m="http://schemas.openxmlformats.org/officeDocument/2006/math">
-                      <m:r>
-                        <a:rPr lang="ko-KR" altLang="en-US" i="1">
-                          <a:latin typeface="Cambria Math" panose="02040503050406030204" pitchFamily="18" charset="0"/>
-                        </a:rPr>
-                        <m:t>𝜃</m:t>
-                      </m:r>
-                      <m:r>
-                        <a:rPr lang="en-US" altLang="ko-KR" i="1">
-                          <a:latin typeface="Cambria Math" panose="02040503050406030204" pitchFamily="18" charset="0"/>
-                        </a:rPr>
-                        <m:t>=</m:t>
-                      </m:r>
-                      <m:r>
-                        <m:rPr>
-                          <m:sty m:val="p"/>
-                        </m:rPr>
-                        <a:rPr lang="en-US" altLang="ko-KR">
-                          <a:latin typeface="Cambria Math" panose="02040503050406030204" pitchFamily="18" charset="0"/>
-                        </a:rPr>
-                        <m:t>atan</m:t>
-                      </m:r>
-                      <m:r>
-                        <a:rPr lang="en-US" altLang="ko-KR">
-                          <a:latin typeface="Cambria Math" panose="02040503050406030204" pitchFamily="18" charset="0"/>
-                        </a:rPr>
-                        <m:t>2</m:t>
-                      </m:r>
-                      <m:r>
-                        <a:rPr lang="en-US" altLang="ko-KR" i="1">
-                          <a:latin typeface="Cambria Math" panose="02040503050406030204" pitchFamily="18" charset="0"/>
-                        </a:rPr>
-                        <m:t>⁡(</m:t>
-                      </m:r>
-                      <m:r>
-                        <a:rPr lang="en-US" altLang="ko-KR" i="1">
-                          <a:latin typeface="Cambria Math" panose="02040503050406030204" pitchFamily="18" charset="0"/>
-                        </a:rPr>
-                        <m:t>𝑦</m:t>
-                      </m:r>
-                      <m:r>
-                        <a:rPr lang="en-US" altLang="ko-KR" i="1">
-                          <a:latin typeface="Cambria Math" panose="02040503050406030204" pitchFamily="18" charset="0"/>
-                        </a:rPr>
-                        <m:t>, </m:t>
-                      </m:r>
-                      <m:r>
-                        <a:rPr lang="en-US" altLang="ko-KR" i="1">
-                          <a:latin typeface="Cambria Math" panose="02040503050406030204" pitchFamily="18" charset="0"/>
-                        </a:rPr>
-                        <m:t>𝑥</m:t>
-                      </m:r>
-                      <m:r>
-                        <a:rPr lang="en-US" altLang="ko-KR" i="1">
-                          <a:latin typeface="Cambria Math" panose="02040503050406030204" pitchFamily="18" charset="0"/>
-                        </a:rPr>
-                        <m:t>)</m:t>
-                      </m:r>
-                    </m:oMath>
-                  </m:oMathPara>
-                </a14:m>
-                <a:endParaRPr lang="en-US" altLang="ko-KR" dirty="0">
-                  <a:latin typeface="Cambria Math" panose="02040503050406030204" pitchFamily="18" charset="0"/>
-                </a:endParaRPr>
-              </a:p>
-              <a:p>
-                <a:pPr/>
                 <a:endParaRPr lang="en-US" altLang="ko-KR" dirty="0">
                   <a:latin typeface="Cambria Math" panose="02040503050406030204" pitchFamily="18" charset="0"/>
                 </a:endParaRPr>
@@ -4622,45 +3926,46 @@
                 </a:endParaRPr>
               </a:p>
               <a:p>
-                <a:pPr/>
                 <a:endParaRPr lang="en-US" altLang="ko-KR" dirty="0">
                   <a:latin typeface="Cambria Math" panose="02040503050406030204" pitchFamily="18" charset="0"/>
                 </a:endParaRPr>
               </a:p>
               <a:p>
-                <a:pPr/>
                 <a:r>
                   <a:rPr lang="ko-KR" altLang="en-US" dirty="0">
                     <a:latin typeface="Cambria Math" panose="02040503050406030204" pitchFamily="18" charset="0"/>
                   </a:rPr>
-                  <a:t>단위 벡터로 변환</a:t>
+                  <a:t>기저 벡터로 변환</a:t>
                 </a:r>
                 <a:endParaRPr lang="en-US" altLang="ko-KR" dirty="0">
                   <a:latin typeface="Cambria Math" panose="02040503050406030204" pitchFamily="18" charset="0"/>
                 </a:endParaRPr>
               </a:p>
               <a:p>
-                <a:pPr/>
+                <a:r>
+                  <a:rPr lang="en-US" altLang="ko-KR" dirty="0" err="1">
+                    <a:latin typeface="Cambria Math" panose="02040503050406030204" pitchFamily="18" charset="0"/>
+                  </a:rPr>
+                  <a:t>unitVector</a:t>
+                </a:r>
                 <a:r>
                   <a:rPr lang="en-US" altLang="ko-KR" dirty="0">
                     <a:latin typeface="Cambria Math" panose="02040503050406030204" pitchFamily="18" charset="0"/>
                   </a:rPr>
-                  <a:t>Vector = vector / r</a:t>
+                  <a:t> = vector / r</a:t>
                 </a:r>
               </a:p>
               <a:p>
-                <a:pPr/>
                 <a:endParaRPr lang="en-US" altLang="ko-KR" dirty="0">
                   <a:latin typeface="Cambria Math" panose="02040503050406030204" pitchFamily="18" charset="0"/>
                 </a:endParaRPr>
               </a:p>
               <a:p>
-                <a:pPr/>
                 <a:r>
                   <a:rPr lang="ko-KR" altLang="en-US" dirty="0">
                     <a:latin typeface="Cambria Math" panose="02040503050406030204" pitchFamily="18" charset="0"/>
                   </a:rPr>
-                  <a:t>단위 벡터에 스칼라</a:t>
+                  <a:t>기저 벡터에 스칼라</a:t>
                 </a:r>
                 <a:r>
                   <a:rPr lang="en-US" altLang="ko-KR" dirty="0">
@@ -4679,7 +3984,6 @@
                 </a:endParaRPr>
               </a:p>
               <a:p>
-                <a:pPr/>
                 <a:r>
                   <a:rPr lang="en-US" altLang="ko-KR" dirty="0">
                     <a:latin typeface="Cambria Math" panose="02040503050406030204" pitchFamily="18" charset="0"/>
@@ -4700,13 +4004,11 @@
                 </a:r>
               </a:p>
               <a:p>
-                <a:pPr/>
                 <a:endParaRPr lang="en-US" altLang="ko-KR" dirty="0">
                   <a:latin typeface="Cambria Math" panose="02040503050406030204" pitchFamily="18" charset="0"/>
                 </a:endParaRPr>
               </a:p>
               <a:p>
-                <a:pPr/>
                 <a:r>
                   <a:rPr lang="ko-KR" altLang="en-US" dirty="0">
                     <a:latin typeface="Cambria Math" panose="02040503050406030204" pitchFamily="18" charset="0"/>
@@ -4718,7 +4020,6 @@
                 </a:endParaRPr>
               </a:p>
               <a:p>
-                <a:pPr/>
                 <a:r>
                   <a:rPr lang="en-US" altLang="ko-KR" dirty="0">
                     <a:latin typeface="Cambria Math" panose="02040503050406030204" pitchFamily="18" charset="0"/>
@@ -4747,15 +4048,15 @@
             <p:spPr>
               <a:xfrm>
                 <a:off x="3061070" y="187801"/>
-                <a:ext cx="3974165" cy="4870116"/>
+                <a:ext cx="3974165" cy="4033925"/>
               </a:xfrm>
               <a:prstGeom prst="rect">
                 <a:avLst/>
               </a:prstGeom>
               <a:blipFill>
-                <a:blip r:embed="rId4"/>
+                <a:blip r:embed="rId2"/>
                 <a:stretch>
-                  <a:fillRect l="-1227" r="-613" b="-1001"/>
+                  <a:fillRect l="-1227" r="-613" b="-1360"/>
                 </a:stretch>
               </a:blipFill>
             </p:spPr>
@@ -4794,6 +4095,142 @@
           <a:prstGeom prst="rightArrow">
             <a:avLst/>
           </a:prstGeom>
+        </p:spPr>
+        <p:style>
+          <a:lnRef idx="2">
+            <a:schemeClr val="accent1">
+              <a:shade val="50000"/>
+            </a:schemeClr>
+          </a:lnRef>
+          <a:fillRef idx="1">
+            <a:schemeClr val="accent1"/>
+          </a:fillRef>
+          <a:effectRef idx="0">
+            <a:schemeClr val="accent1"/>
+          </a:effectRef>
+          <a:fontRef idx="minor">
+            <a:schemeClr val="lt1"/>
+          </a:fontRef>
+        </p:style>
+        <p:txBody>
+          <a:bodyPr rtlCol="0" anchor="ctr"/>
+          <a:lstStyle/>
+          <a:p>
+            <a:pPr algn="ctr"/>
+            <a:endParaRPr lang="ko-KR" altLang="en-US"/>
+          </a:p>
+        </p:txBody>
+      </p:sp>
+      <p:cxnSp>
+        <p:nvCxnSpPr>
+          <p:cNvPr id="20" name="직선 화살표 연결선 19">
+            <a:extLst>
+              <a:ext uri="{FF2B5EF4-FFF2-40B4-BE49-F238E27FC236}">
+                <a16:creationId xmlns:a16="http://schemas.microsoft.com/office/drawing/2014/main" id="{C7EF4319-10CA-43C5-91FE-18AE47113507}"/>
+              </a:ext>
+            </a:extLst>
+          </p:cNvPr>
+          <p:cNvCxnSpPr>
+            <a:cxnSpLocks/>
+          </p:cNvCxnSpPr>
+          <p:nvPr/>
+        </p:nvCxnSpPr>
+        <p:spPr>
+          <a:xfrm flipH="1">
+            <a:off x="1223158" y="623455"/>
+            <a:ext cx="134587" cy="308758"/>
+          </a:xfrm>
+          <a:prstGeom prst="straightConnector1">
+            <a:avLst/>
+          </a:prstGeom>
+          <a:ln w="19050">
+            <a:solidFill>
+              <a:srgbClr val="FF0000"/>
+            </a:solidFill>
+            <a:tailEnd type="triangle"/>
+          </a:ln>
+        </p:spPr>
+        <p:style>
+          <a:lnRef idx="1">
+            <a:schemeClr val="dk1"/>
+          </a:lnRef>
+          <a:fillRef idx="0">
+            <a:schemeClr val="dk1"/>
+          </a:fillRef>
+          <a:effectRef idx="0">
+            <a:schemeClr val="dk1"/>
+          </a:effectRef>
+          <a:fontRef idx="minor">
+            <a:schemeClr val="tx1"/>
+          </a:fontRef>
+        </p:style>
+      </p:cxnSp>
+      <p:sp>
+        <p:nvSpPr>
+          <p:cNvPr id="22" name="TextBox 21">
+            <a:extLst>
+              <a:ext uri="{FF2B5EF4-FFF2-40B4-BE49-F238E27FC236}">
+                <a16:creationId xmlns:a16="http://schemas.microsoft.com/office/drawing/2014/main" id="{742B9BB7-C7E5-E2D4-0F06-F5AEFCDF937B}"/>
+              </a:ext>
+            </a:extLst>
+          </p:cNvPr>
+          <p:cNvSpPr txBox="1"/>
+          <p:nvPr/>
+        </p:nvSpPr>
+        <p:spPr>
+          <a:xfrm>
+            <a:off x="574964" y="788021"/>
+            <a:ext cx="699902" cy="215444"/>
+          </a:xfrm>
+          <a:prstGeom prst="rect">
+            <a:avLst/>
+          </a:prstGeom>
+          <a:noFill/>
+        </p:spPr>
+        <p:txBody>
+          <a:bodyPr wrap="square">
+            <a:spAutoFit/>
+          </a:bodyPr>
+          <a:lstStyle/>
+          <a:p>
+            <a:r>
+              <a:rPr lang="en-US" altLang="ko-KR" sz="800" dirty="0">
+                <a:latin typeface="Cambria Math" panose="02040503050406030204" pitchFamily="18" charset="0"/>
+              </a:rPr>
+              <a:t>Destination</a:t>
+            </a:r>
+            <a:endParaRPr lang="ko-KR" altLang="en-US" sz="800" dirty="0"/>
+          </a:p>
+        </p:txBody>
+      </p:sp>
+      <p:sp>
+        <p:nvSpPr>
+          <p:cNvPr id="11" name="타원 10">
+            <a:extLst>
+              <a:ext uri="{FF2B5EF4-FFF2-40B4-BE49-F238E27FC236}">
+                <a16:creationId xmlns:a16="http://schemas.microsoft.com/office/drawing/2014/main" id="{C27AACE7-F46B-DB35-B882-42B1E72101C4}"/>
+              </a:ext>
+            </a:extLst>
+          </p:cNvPr>
+          <p:cNvSpPr/>
+          <p:nvPr/>
+        </p:nvSpPr>
+        <p:spPr>
+          <a:xfrm>
+            <a:off x="1182129" y="914224"/>
+            <a:ext cx="51708" cy="51708"/>
+          </a:xfrm>
+          <a:prstGeom prst="ellipse">
+            <a:avLst/>
+          </a:prstGeom>
+          <a:solidFill>
+            <a:schemeClr val="tx1"/>
+          </a:solidFill>
+          <a:ln>
+            <a:solidFill>
+              <a:schemeClr val="tx1"/>
+            </a:solidFill>
+          </a:ln>
         </p:spPr>
         <p:style>
           <a:lnRef idx="2">

</xml_diff>